<commit_message>
Added links and fixed typos
</commit_message>
<xml_diff>
--- a/PathogenDataCourse/SlideSets/PlasmodiumGenomics.pptx
+++ b/PathogenDataCourse/SlideSets/PlasmodiumGenomics.pptx
@@ -5,7 +5,7 @@
     <p:sldMasterId id="2147483648" r:id="rId4"/>
   </p:sldMasterIdLst>
   <p:notesMasterIdLst>
-    <p:notesMasterId r:id="rId24"/>
+    <p:notesMasterId r:id="rId25"/>
   </p:notesMasterIdLst>
   <p:sldIdLst>
     <p:sldId id="256" r:id="rId5"/>
@@ -26,7 +26,8 @@
     <p:sldId id="349" r:id="rId20"/>
     <p:sldId id="350" r:id="rId21"/>
     <p:sldId id="351" r:id="rId22"/>
-    <p:sldId id="353" r:id="rId23"/>
+    <p:sldId id="354" r:id="rId23"/>
+    <p:sldId id="353" r:id="rId24"/>
   </p:sldIdLst>
   <p:sldSz cx="12192000" cy="6858000"/>
   <p:notesSz cx="6858000" cy="9144000"/>
@@ -1711,7 +1712,7 @@
           <a:p>
             <a:fld id="{C4181D7C-81F1-BA48-B0CF-02C398C91972}" type="datetimeFigureOut">
               <a:rPr lang="en-US" smtClean="0"/>
-              <a:t>7/16/23</a:t>
+              <a:t>7/18/23</a:t>
             </a:fld>
             <a:endParaRPr lang="en-US"/>
           </a:p>
@@ -2023,7 +2024,7 @@
           <a:bodyPr/>
           <a:lstStyle/>
           <a:p>
-            <a:endParaRPr lang="en-US" dirty="0"/>
+            <a:endParaRPr lang="en-GB"/>
           </a:p>
         </p:txBody>
       </p:sp>
@@ -2044,7 +2045,7 @@
           <a:p>
             <a:fld id="{D7F88987-9C11-FC43-B2CE-3A9A6A29209B}" type="slidenum">
               <a:rPr lang="en-US" smtClean="0"/>
-              <a:t>2</a:t>
+              <a:t>1</a:t>
             </a:fld>
             <a:endParaRPr lang="en-US"/>
           </a:p>
@@ -2053,7 +2054,7 @@
     </p:spTree>
     <p:extLst>
       <p:ext uri="{BB962C8B-B14F-4D97-AF65-F5344CB8AC3E}">
-        <p14:creationId xmlns:p14="http://schemas.microsoft.com/office/powerpoint/2010/main" val="1010351270"/>
+        <p14:creationId xmlns:p14="http://schemas.microsoft.com/office/powerpoint/2010/main" val="3734748050"/>
       </p:ext>
     </p:extLst>
   </p:cSld>
@@ -2128,7 +2129,7 @@
           <a:p>
             <a:fld id="{D7F88987-9C11-FC43-B2CE-3A9A6A29209B}" type="slidenum">
               <a:rPr lang="en-US" smtClean="0"/>
-              <a:t>11</a:t>
+              <a:t>10</a:t>
             </a:fld>
             <a:endParaRPr lang="en-US"/>
           </a:p>
@@ -2137,7 +2138,7 @@
     </p:spTree>
     <p:extLst>
       <p:ext uri="{BB962C8B-B14F-4D97-AF65-F5344CB8AC3E}">
-        <p14:creationId xmlns:p14="http://schemas.microsoft.com/office/powerpoint/2010/main" val="3757832854"/>
+        <p14:creationId xmlns:p14="http://schemas.microsoft.com/office/powerpoint/2010/main" val="1558808040"/>
       </p:ext>
     </p:extLst>
   </p:cSld>
@@ -2212,7 +2213,7 @@
           <a:p>
             <a:fld id="{D7F88987-9C11-FC43-B2CE-3A9A6A29209B}" type="slidenum">
               <a:rPr lang="en-US" smtClean="0"/>
-              <a:t>12</a:t>
+              <a:t>11</a:t>
             </a:fld>
             <a:endParaRPr lang="en-US"/>
           </a:p>
@@ -2221,7 +2222,7 @@
     </p:spTree>
     <p:extLst>
       <p:ext uri="{BB962C8B-B14F-4D97-AF65-F5344CB8AC3E}">
-        <p14:creationId xmlns:p14="http://schemas.microsoft.com/office/powerpoint/2010/main" val="2492190957"/>
+        <p14:creationId xmlns:p14="http://schemas.microsoft.com/office/powerpoint/2010/main" val="3757832854"/>
       </p:ext>
     </p:extLst>
   </p:cSld>
@@ -2296,7 +2297,7 @@
           <a:p>
             <a:fld id="{D7F88987-9C11-FC43-B2CE-3A9A6A29209B}" type="slidenum">
               <a:rPr lang="en-US" smtClean="0"/>
-              <a:t>13</a:t>
+              <a:t>12</a:t>
             </a:fld>
             <a:endParaRPr lang="en-US"/>
           </a:p>
@@ -2305,7 +2306,7 @@
     </p:spTree>
     <p:extLst>
       <p:ext uri="{BB962C8B-B14F-4D97-AF65-F5344CB8AC3E}">
-        <p14:creationId xmlns:p14="http://schemas.microsoft.com/office/powerpoint/2010/main" val="448990291"/>
+        <p14:creationId xmlns:p14="http://schemas.microsoft.com/office/powerpoint/2010/main" val="2492190957"/>
       </p:ext>
     </p:extLst>
   </p:cSld>
@@ -2380,7 +2381,7 @@
           <a:p>
             <a:fld id="{D7F88987-9C11-FC43-B2CE-3A9A6A29209B}" type="slidenum">
               <a:rPr lang="en-US" smtClean="0"/>
-              <a:t>14</a:t>
+              <a:t>13</a:t>
             </a:fld>
             <a:endParaRPr lang="en-US"/>
           </a:p>
@@ -2389,7 +2390,7 @@
     </p:spTree>
     <p:extLst>
       <p:ext uri="{BB962C8B-B14F-4D97-AF65-F5344CB8AC3E}">
-        <p14:creationId xmlns:p14="http://schemas.microsoft.com/office/powerpoint/2010/main" val="3612172049"/>
+        <p14:creationId xmlns:p14="http://schemas.microsoft.com/office/powerpoint/2010/main" val="448990291"/>
       </p:ext>
     </p:extLst>
   </p:cSld>
@@ -2464,7 +2465,7 @@
           <a:p>
             <a:fld id="{D7F88987-9C11-FC43-B2CE-3A9A6A29209B}" type="slidenum">
               <a:rPr lang="en-US" smtClean="0"/>
-              <a:t>15</a:t>
+              <a:t>14</a:t>
             </a:fld>
             <a:endParaRPr lang="en-US"/>
           </a:p>
@@ -2473,7 +2474,7 @@
     </p:spTree>
     <p:extLst>
       <p:ext uri="{BB962C8B-B14F-4D97-AF65-F5344CB8AC3E}">
-        <p14:creationId xmlns:p14="http://schemas.microsoft.com/office/powerpoint/2010/main" val="3200558069"/>
+        <p14:creationId xmlns:p14="http://schemas.microsoft.com/office/powerpoint/2010/main" val="3612172049"/>
       </p:ext>
     </p:extLst>
   </p:cSld>
@@ -2548,7 +2549,7 @@
           <a:p>
             <a:fld id="{D7F88987-9C11-FC43-B2CE-3A9A6A29209B}" type="slidenum">
               <a:rPr lang="en-US" smtClean="0"/>
-              <a:t>16</a:t>
+              <a:t>15</a:t>
             </a:fld>
             <a:endParaRPr lang="en-US"/>
           </a:p>
@@ -2557,7 +2558,7 @@
     </p:spTree>
     <p:extLst>
       <p:ext uri="{BB962C8B-B14F-4D97-AF65-F5344CB8AC3E}">
-        <p14:creationId xmlns:p14="http://schemas.microsoft.com/office/powerpoint/2010/main" val="577964352"/>
+        <p14:creationId xmlns:p14="http://schemas.microsoft.com/office/powerpoint/2010/main" val="3200558069"/>
       </p:ext>
     </p:extLst>
   </p:cSld>
@@ -2632,7 +2633,7 @@
           <a:p>
             <a:fld id="{D7F88987-9C11-FC43-B2CE-3A9A6A29209B}" type="slidenum">
               <a:rPr lang="en-US" smtClean="0"/>
-              <a:t>17</a:t>
+              <a:t>16</a:t>
             </a:fld>
             <a:endParaRPr lang="en-US"/>
           </a:p>
@@ -2641,7 +2642,7 @@
     </p:spTree>
     <p:extLst>
       <p:ext uri="{BB962C8B-B14F-4D97-AF65-F5344CB8AC3E}">
-        <p14:creationId xmlns:p14="http://schemas.microsoft.com/office/powerpoint/2010/main" val="432412171"/>
+        <p14:creationId xmlns:p14="http://schemas.microsoft.com/office/powerpoint/2010/main" val="577964352"/>
       </p:ext>
     </p:extLst>
   </p:cSld>
@@ -2716,7 +2717,7 @@
           <a:p>
             <a:fld id="{D7F88987-9C11-FC43-B2CE-3A9A6A29209B}" type="slidenum">
               <a:rPr lang="en-US" smtClean="0"/>
-              <a:t>18</a:t>
+              <a:t>17</a:t>
             </a:fld>
             <a:endParaRPr lang="en-US"/>
           </a:p>
@@ -2725,7 +2726,7 @@
     </p:spTree>
     <p:extLst>
       <p:ext uri="{BB962C8B-B14F-4D97-AF65-F5344CB8AC3E}">
-        <p14:creationId xmlns:p14="http://schemas.microsoft.com/office/powerpoint/2010/main" val="3316543358"/>
+        <p14:creationId xmlns:p14="http://schemas.microsoft.com/office/powerpoint/2010/main" val="432412171"/>
       </p:ext>
     </p:extLst>
   </p:cSld>
@@ -2800,6 +2801,90 @@
           <a:p>
             <a:fld id="{D7F88987-9C11-FC43-B2CE-3A9A6A29209B}" type="slidenum">
               <a:rPr lang="en-US" smtClean="0"/>
+              <a:t>18</a:t>
+            </a:fld>
+            <a:endParaRPr lang="en-US"/>
+          </a:p>
+        </p:txBody>
+      </p:sp>
+    </p:spTree>
+    <p:extLst>
+      <p:ext uri="{BB962C8B-B14F-4D97-AF65-F5344CB8AC3E}">
+        <p14:creationId xmlns:p14="http://schemas.microsoft.com/office/powerpoint/2010/main" val="3316543358"/>
+      </p:ext>
+    </p:extLst>
+  </p:cSld>
+  <p:clrMapOvr>
+    <a:masterClrMapping/>
+  </p:clrMapOvr>
+</p:notes>
+</file>
+
+<file path=ppt/notesSlides/notesSlide19.xml><?xml version="1.0" encoding="utf-8"?>
+<p:notes xmlns:a="http://schemas.openxmlformats.org/drawingml/2006/main" xmlns:r="http://schemas.openxmlformats.org/officeDocument/2006/relationships" xmlns:p="http://schemas.openxmlformats.org/presentationml/2006/main">
+  <p:cSld>
+    <p:spTree>
+      <p:nvGrpSpPr>
+        <p:cNvPr id="1" name=""/>
+        <p:cNvGrpSpPr/>
+        <p:nvPr/>
+      </p:nvGrpSpPr>
+      <p:grpSpPr>
+        <a:xfrm>
+          <a:off x="0" y="0"/>
+          <a:ext cx="0" cy="0"/>
+          <a:chOff x="0" y="0"/>
+          <a:chExt cx="0" cy="0"/>
+        </a:xfrm>
+      </p:grpSpPr>
+      <p:sp>
+        <p:nvSpPr>
+          <p:cNvPr id="2" name="Slide Image Placeholder 1"/>
+          <p:cNvSpPr>
+            <a:spLocks noGrp="1" noRot="1" noChangeAspect="1"/>
+          </p:cNvSpPr>
+          <p:nvPr>
+            <p:ph type="sldImg"/>
+          </p:nvPr>
+        </p:nvSpPr>
+        <p:spPr/>
+      </p:sp>
+      <p:sp>
+        <p:nvSpPr>
+          <p:cNvPr id="3" name="Notes Placeholder 2"/>
+          <p:cNvSpPr>
+            <a:spLocks noGrp="1"/>
+          </p:cNvSpPr>
+          <p:nvPr>
+            <p:ph type="body" idx="1"/>
+          </p:nvPr>
+        </p:nvSpPr>
+        <p:spPr/>
+        <p:txBody>
+          <a:bodyPr/>
+          <a:lstStyle/>
+          <a:p>
+            <a:endParaRPr lang="en-US" dirty="0"/>
+          </a:p>
+        </p:txBody>
+      </p:sp>
+      <p:sp>
+        <p:nvSpPr>
+          <p:cNvPr id="4" name="Slide Number Placeholder 3"/>
+          <p:cNvSpPr>
+            <a:spLocks noGrp="1"/>
+          </p:cNvSpPr>
+          <p:nvPr>
+            <p:ph type="sldNum" sz="quarter" idx="5"/>
+          </p:nvPr>
+        </p:nvSpPr>
+        <p:spPr/>
+        <p:txBody>
+          <a:bodyPr/>
+          <a:lstStyle/>
+          <a:p>
+            <a:fld id="{D7F88987-9C11-FC43-B2CE-3A9A6A29209B}" type="slidenum">
+              <a:rPr lang="en-US" smtClean="0"/>
               <a:t>19</a:t>
             </a:fld>
             <a:endParaRPr lang="en-US"/>
@@ -2809,7 +2894,7 @@
     </p:spTree>
     <p:extLst>
       <p:ext uri="{BB962C8B-B14F-4D97-AF65-F5344CB8AC3E}">
-        <p14:creationId xmlns:p14="http://schemas.microsoft.com/office/powerpoint/2010/main" val="1317653579"/>
+        <p14:creationId xmlns:p14="http://schemas.microsoft.com/office/powerpoint/2010/main" val="1626099586"/>
       </p:ext>
     </p:extLst>
   </p:cSld>
@@ -2884,7 +2969,7 @@
           <a:p>
             <a:fld id="{D7F88987-9C11-FC43-B2CE-3A9A6A29209B}" type="slidenum">
               <a:rPr lang="en-US" smtClean="0"/>
-              <a:t>3</a:t>
+              <a:t>2</a:t>
             </a:fld>
             <a:endParaRPr lang="en-US"/>
           </a:p>
@@ -2893,7 +2978,91 @@
     </p:spTree>
     <p:extLst>
       <p:ext uri="{BB962C8B-B14F-4D97-AF65-F5344CB8AC3E}">
-        <p14:creationId xmlns:p14="http://schemas.microsoft.com/office/powerpoint/2010/main" val="2234632494"/>
+        <p14:creationId xmlns:p14="http://schemas.microsoft.com/office/powerpoint/2010/main" val="1010351270"/>
+      </p:ext>
+    </p:extLst>
+  </p:cSld>
+  <p:clrMapOvr>
+    <a:masterClrMapping/>
+  </p:clrMapOvr>
+</p:notes>
+</file>
+
+<file path=ppt/notesSlides/notesSlide20.xml><?xml version="1.0" encoding="utf-8"?>
+<p:notes xmlns:a="http://schemas.openxmlformats.org/drawingml/2006/main" xmlns:r="http://schemas.openxmlformats.org/officeDocument/2006/relationships" xmlns:p="http://schemas.openxmlformats.org/presentationml/2006/main">
+  <p:cSld>
+    <p:spTree>
+      <p:nvGrpSpPr>
+        <p:cNvPr id="1" name=""/>
+        <p:cNvGrpSpPr/>
+        <p:nvPr/>
+      </p:nvGrpSpPr>
+      <p:grpSpPr>
+        <a:xfrm>
+          <a:off x="0" y="0"/>
+          <a:ext cx="0" cy="0"/>
+          <a:chOff x="0" y="0"/>
+          <a:chExt cx="0" cy="0"/>
+        </a:xfrm>
+      </p:grpSpPr>
+      <p:sp>
+        <p:nvSpPr>
+          <p:cNvPr id="2" name="Slide Image Placeholder 1"/>
+          <p:cNvSpPr>
+            <a:spLocks noGrp="1" noRot="1" noChangeAspect="1"/>
+          </p:cNvSpPr>
+          <p:nvPr>
+            <p:ph type="sldImg"/>
+          </p:nvPr>
+        </p:nvSpPr>
+        <p:spPr/>
+      </p:sp>
+      <p:sp>
+        <p:nvSpPr>
+          <p:cNvPr id="3" name="Notes Placeholder 2"/>
+          <p:cNvSpPr>
+            <a:spLocks noGrp="1"/>
+          </p:cNvSpPr>
+          <p:nvPr>
+            <p:ph type="body" idx="1"/>
+          </p:nvPr>
+        </p:nvSpPr>
+        <p:spPr/>
+        <p:txBody>
+          <a:bodyPr/>
+          <a:lstStyle/>
+          <a:p>
+            <a:endParaRPr lang="en-US" dirty="0"/>
+          </a:p>
+        </p:txBody>
+      </p:sp>
+      <p:sp>
+        <p:nvSpPr>
+          <p:cNvPr id="4" name="Slide Number Placeholder 3"/>
+          <p:cNvSpPr>
+            <a:spLocks noGrp="1"/>
+          </p:cNvSpPr>
+          <p:nvPr>
+            <p:ph type="sldNum" sz="quarter" idx="5"/>
+          </p:nvPr>
+        </p:nvSpPr>
+        <p:spPr/>
+        <p:txBody>
+          <a:bodyPr/>
+          <a:lstStyle/>
+          <a:p>
+            <a:fld id="{D7F88987-9C11-FC43-B2CE-3A9A6A29209B}" type="slidenum">
+              <a:rPr lang="en-US" smtClean="0"/>
+              <a:t>20</a:t>
+            </a:fld>
+            <a:endParaRPr lang="en-US"/>
+          </a:p>
+        </p:txBody>
+      </p:sp>
+    </p:spTree>
+    <p:extLst>
+      <p:ext uri="{BB962C8B-B14F-4D97-AF65-F5344CB8AC3E}">
+        <p14:creationId xmlns:p14="http://schemas.microsoft.com/office/powerpoint/2010/main" val="1317653579"/>
       </p:ext>
     </p:extLst>
   </p:cSld>
@@ -2968,7 +3137,7 @@
           <a:p>
             <a:fld id="{D7F88987-9C11-FC43-B2CE-3A9A6A29209B}" type="slidenum">
               <a:rPr lang="en-US" smtClean="0"/>
-              <a:t>4</a:t>
+              <a:t>3</a:t>
             </a:fld>
             <a:endParaRPr lang="en-US"/>
           </a:p>
@@ -2977,7 +3146,7 @@
     </p:spTree>
     <p:extLst>
       <p:ext uri="{BB962C8B-B14F-4D97-AF65-F5344CB8AC3E}">
-        <p14:creationId xmlns:p14="http://schemas.microsoft.com/office/powerpoint/2010/main" val="1524009525"/>
+        <p14:creationId xmlns:p14="http://schemas.microsoft.com/office/powerpoint/2010/main" val="2234632494"/>
       </p:ext>
     </p:extLst>
   </p:cSld>
@@ -3052,7 +3221,7 @@
           <a:p>
             <a:fld id="{D7F88987-9C11-FC43-B2CE-3A9A6A29209B}" type="slidenum">
               <a:rPr lang="en-US" smtClean="0"/>
-              <a:t>5</a:t>
+              <a:t>4</a:t>
             </a:fld>
             <a:endParaRPr lang="en-US"/>
           </a:p>
@@ -3061,7 +3230,7 @@
     </p:spTree>
     <p:extLst>
       <p:ext uri="{BB962C8B-B14F-4D97-AF65-F5344CB8AC3E}">
-        <p14:creationId xmlns:p14="http://schemas.microsoft.com/office/powerpoint/2010/main" val="3983068698"/>
+        <p14:creationId xmlns:p14="http://schemas.microsoft.com/office/powerpoint/2010/main" val="1524009525"/>
       </p:ext>
     </p:extLst>
   </p:cSld>
@@ -3136,7 +3305,7 @@
           <a:p>
             <a:fld id="{D7F88987-9C11-FC43-B2CE-3A9A6A29209B}" type="slidenum">
               <a:rPr lang="en-US" smtClean="0"/>
-              <a:t>6</a:t>
+              <a:t>5</a:t>
             </a:fld>
             <a:endParaRPr lang="en-US"/>
           </a:p>
@@ -3145,7 +3314,7 @@
     </p:spTree>
     <p:extLst>
       <p:ext uri="{BB962C8B-B14F-4D97-AF65-F5344CB8AC3E}">
-        <p14:creationId xmlns:p14="http://schemas.microsoft.com/office/powerpoint/2010/main" val="105086199"/>
+        <p14:creationId xmlns:p14="http://schemas.microsoft.com/office/powerpoint/2010/main" val="3983068698"/>
       </p:ext>
     </p:extLst>
   </p:cSld>
@@ -3220,7 +3389,7 @@
           <a:p>
             <a:fld id="{D7F88987-9C11-FC43-B2CE-3A9A6A29209B}" type="slidenum">
               <a:rPr lang="en-US" smtClean="0"/>
-              <a:t>7</a:t>
+              <a:t>6</a:t>
             </a:fld>
             <a:endParaRPr lang="en-US"/>
           </a:p>
@@ -3229,7 +3398,7 @@
     </p:spTree>
     <p:extLst>
       <p:ext uri="{BB962C8B-B14F-4D97-AF65-F5344CB8AC3E}">
-        <p14:creationId xmlns:p14="http://schemas.microsoft.com/office/powerpoint/2010/main" val="2484013289"/>
+        <p14:creationId xmlns:p14="http://schemas.microsoft.com/office/powerpoint/2010/main" val="105086199"/>
       </p:ext>
     </p:extLst>
   </p:cSld>
@@ -3304,7 +3473,7 @@
           <a:p>
             <a:fld id="{D7F88987-9C11-FC43-B2CE-3A9A6A29209B}" type="slidenum">
               <a:rPr lang="en-US" smtClean="0"/>
-              <a:t>8</a:t>
+              <a:t>7</a:t>
             </a:fld>
             <a:endParaRPr lang="en-US"/>
           </a:p>
@@ -3313,7 +3482,7 @@
     </p:spTree>
     <p:extLst>
       <p:ext uri="{BB962C8B-B14F-4D97-AF65-F5344CB8AC3E}">
-        <p14:creationId xmlns:p14="http://schemas.microsoft.com/office/powerpoint/2010/main" val="3085622810"/>
+        <p14:creationId xmlns:p14="http://schemas.microsoft.com/office/powerpoint/2010/main" val="2484013289"/>
       </p:ext>
     </p:extLst>
   </p:cSld>
@@ -3388,7 +3557,7 @@
           <a:p>
             <a:fld id="{D7F88987-9C11-FC43-B2CE-3A9A6A29209B}" type="slidenum">
               <a:rPr lang="en-US" smtClean="0"/>
-              <a:t>9</a:t>
+              <a:t>8</a:t>
             </a:fld>
             <a:endParaRPr lang="en-US"/>
           </a:p>
@@ -3397,7 +3566,7 @@
     </p:spTree>
     <p:extLst>
       <p:ext uri="{BB962C8B-B14F-4D97-AF65-F5344CB8AC3E}">
-        <p14:creationId xmlns:p14="http://schemas.microsoft.com/office/powerpoint/2010/main" val="2371079785"/>
+        <p14:creationId xmlns:p14="http://schemas.microsoft.com/office/powerpoint/2010/main" val="3085622810"/>
       </p:ext>
     </p:extLst>
   </p:cSld>
@@ -3472,7 +3641,7 @@
           <a:p>
             <a:fld id="{D7F88987-9C11-FC43-B2CE-3A9A6A29209B}" type="slidenum">
               <a:rPr lang="en-US" smtClean="0"/>
-              <a:t>10</a:t>
+              <a:t>9</a:t>
             </a:fld>
             <a:endParaRPr lang="en-US"/>
           </a:p>
@@ -3481,7 +3650,7 @@
     </p:spTree>
     <p:extLst>
       <p:ext uri="{BB962C8B-B14F-4D97-AF65-F5344CB8AC3E}">
-        <p14:creationId xmlns:p14="http://schemas.microsoft.com/office/powerpoint/2010/main" val="1558808040"/>
+        <p14:creationId xmlns:p14="http://schemas.microsoft.com/office/powerpoint/2010/main" val="2371079785"/>
       </p:ext>
     </p:extLst>
   </p:cSld>
@@ -3757,7 +3926,7 @@
             <a:fld id="{197342E9-89D0-D246-B0E5-635614E13D75}" type="datetime1">
               <a:rPr lang="en-GB" smtClean="0"/>
               <a:pPr/>
-              <a:t>16/07/2023</a:t>
+              <a:t>18/07/2023</a:t>
             </a:fld>
             <a:endParaRPr lang="en-US" dirty="0"/>
           </a:p>
@@ -8375,7 +8544,7 @@
             <a:fld id="{197342E9-89D0-D246-B0E5-635614E13D75}" type="datetime1">
               <a:rPr lang="en-GB" smtClean="0"/>
               <a:pPr/>
-              <a:t>16/07/2023</a:t>
+              <a:t>18/07/2023</a:t>
             </a:fld>
             <a:endParaRPr lang="en-US" dirty="0"/>
           </a:p>
@@ -11458,7 +11627,7 @@
             <a:fld id="{197342E9-89D0-D246-B0E5-635614E13D75}" type="datetime1">
               <a:rPr lang="en-GB" smtClean="0"/>
               <a:pPr/>
-              <a:t>16/07/2023</a:t>
+              <a:t>18/07/2023</a:t>
             </a:fld>
             <a:endParaRPr lang="en-US" dirty="0"/>
           </a:p>
@@ -13909,10 +14078,10 @@
           <a:lstStyle/>
           <a:p>
             <a:r>
-              <a:rPr lang="en-GB" sz="4000" dirty="0"/>
+              <a:rPr lang="en-GB" sz="4000" noProof="0" dirty="0"/>
               <a:t>Plasmodium genomics</a:t>
             </a:r>
-            <a:endParaRPr lang="en-US" sz="4000" i="1" dirty="0"/>
+            <a:endParaRPr lang="en-GB" sz="4000" i="1" noProof="0" dirty="0"/>
           </a:p>
         </p:txBody>
       </p:sp>
@@ -13940,27 +14109,27 @@
           <a:lstStyle/>
           <a:p>
             <a:r>
-              <a:rPr lang="en-US" dirty="0"/>
+              <a:rPr lang="en-GB" noProof="0" dirty="0"/>
               <a:t>Conor Meehan (he/they)</a:t>
             </a:r>
           </a:p>
           <a:p>
             <a:r>
-              <a:rPr lang="en-US" dirty="0" err="1"/>
+              <a:rPr lang="en-GB" noProof="0" dirty="0" err="1"/>
               <a:t>conor.meehan@ntu.ac.uk</a:t>
             </a:r>
-            <a:endParaRPr lang="en-US" dirty="0"/>
-          </a:p>
-          <a:p>
-            <a:r>
-              <a:rPr lang="en-US" dirty="0"/>
+            <a:endParaRPr lang="en-GB" noProof="0" dirty="0"/>
+          </a:p>
+          <a:p>
+            <a:r>
+              <a:rPr lang="en-GB" noProof="0" dirty="0"/>
               <a:t>@</a:t>
             </a:r>
             <a:r>
-              <a:rPr lang="en-US" dirty="0" err="1"/>
+              <a:rPr lang="en-GB" noProof="0" dirty="0" err="1"/>
               <a:t>con_meehan</a:t>
             </a:r>
-            <a:endParaRPr lang="en-US" dirty="0"/>
+            <a:endParaRPr lang="en-GB" noProof="0" dirty="0"/>
           </a:p>
         </p:txBody>
       </p:sp>
@@ -14191,95 +14360,95 @@
           <a:lstStyle/>
           <a:p>
             <a:r>
-              <a:rPr lang="en-GB" sz="2400" dirty="0"/>
+              <a:rPr lang="en-GB" sz="2400" noProof="0" dirty="0"/>
               <a:t>Targeted (amplicon) sequencing</a:t>
             </a:r>
           </a:p>
           <a:p>
             <a:pPr lvl="1"/>
             <a:r>
-              <a:rPr lang="en-GB" sz="2100" dirty="0"/>
+              <a:rPr lang="en-GB" sz="2100" noProof="0" dirty="0"/>
               <a:t>Few targets</a:t>
             </a:r>
           </a:p>
           <a:p>
             <a:pPr lvl="1"/>
             <a:r>
-              <a:rPr lang="en-GB" sz="2100" dirty="0"/>
+              <a:rPr lang="en-GB" sz="2100" noProof="0" dirty="0"/>
               <a:t>Cost effective</a:t>
             </a:r>
           </a:p>
           <a:p>
             <a:pPr lvl="1"/>
             <a:r>
-              <a:rPr lang="en-GB" sz="2100" dirty="0"/>
+              <a:rPr lang="en-GB" sz="2100" noProof="0" dirty="0"/>
               <a:t>May miss diversity</a:t>
             </a:r>
           </a:p>
           <a:p>
             <a:pPr lvl="2"/>
             <a:r>
-              <a:rPr lang="en-GB" sz="1900" dirty="0"/>
+              <a:rPr lang="en-GB" sz="1900" noProof="0" dirty="0"/>
               <a:t>Reduced if panels local constructed correctly</a:t>
             </a:r>
           </a:p>
           <a:p>
             <a:pPr lvl="1"/>
             <a:r>
-              <a:rPr lang="en-GB" sz="2100" dirty="0"/>
+              <a:rPr lang="en-GB" sz="2100" noProof="0" dirty="0"/>
               <a:t>Works from dried blood spots (DBS)</a:t>
             </a:r>
           </a:p>
           <a:p>
-            <a:endParaRPr lang="en-GB" sz="2400" dirty="0"/>
-          </a:p>
-          <a:p>
-            <a:r>
-              <a:rPr lang="en-GB" sz="2400" dirty="0"/>
+            <a:endParaRPr lang="en-GB" sz="2400" noProof="0" dirty="0"/>
+          </a:p>
+          <a:p>
+            <a:r>
+              <a:rPr lang="en-GB" sz="2400" noProof="0" dirty="0"/>
               <a:t>Selective whole genome amplification</a:t>
             </a:r>
           </a:p>
           <a:p>
             <a:pPr lvl="1"/>
             <a:r>
-              <a:rPr lang="en-GB" sz="2100" dirty="0"/>
+              <a:rPr lang="en-GB" sz="2100" noProof="0" dirty="0"/>
               <a:t>Many targets</a:t>
             </a:r>
           </a:p>
           <a:p>
             <a:pPr lvl="1"/>
             <a:r>
-              <a:rPr lang="en-GB" sz="2100" dirty="0"/>
+              <a:rPr lang="en-GB" sz="2100" noProof="0" dirty="0"/>
               <a:t>Captures most diversity</a:t>
             </a:r>
           </a:p>
           <a:p>
             <a:pPr lvl="1"/>
             <a:r>
-              <a:rPr lang="en-GB" sz="2100" dirty="0"/>
+              <a:rPr lang="en-GB" sz="2100" noProof="0" dirty="0"/>
               <a:t>Very expensive and difficult (currently)</a:t>
             </a:r>
           </a:p>
           <a:p>
             <a:pPr lvl="1"/>
             <a:r>
-              <a:rPr lang="en-GB" sz="2100" dirty="0"/>
+              <a:rPr lang="en-GB" sz="2100" noProof="0" dirty="0"/>
               <a:t>DBS extraction improving</a:t>
             </a:r>
           </a:p>
           <a:p>
-            <a:endParaRPr lang="en-GB" sz="2400" dirty="0"/>
-          </a:p>
-          <a:p>
-            <a:r>
-              <a:rPr lang="en-GB" sz="2400" dirty="0"/>
+            <a:endParaRPr lang="en-GB" sz="2400" noProof="0" dirty="0"/>
+          </a:p>
+          <a:p>
+            <a:r>
+              <a:rPr lang="en-GB" sz="2400" noProof="0" dirty="0"/>
               <a:t>Both useful for population structure and drug resistance</a:t>
             </a:r>
           </a:p>
           <a:p>
             <a:pPr lvl="1"/>
             <a:r>
-              <a:rPr lang="en-GB" sz="2100" dirty="0"/>
+              <a:rPr lang="en-GB" sz="2100" noProof="0" dirty="0"/>
               <a:t>Need to know informative targets</a:t>
             </a:r>
           </a:p>
@@ -17717,71 +17886,70 @@
           <a:p>
             <a:pPr eaLnBrk="1" hangingPunct="1"/>
             <a:r>
-              <a:rPr lang="en-US" altLang="en-US" sz="2800" dirty="0"/>
+              <a:rPr lang="en-GB" altLang="en-US" sz="2800" noProof="0" dirty="0"/>
               <a:t>Non-random association of alleles at different loci in a population</a:t>
             </a:r>
           </a:p>
           <a:p>
             <a:pPr eaLnBrk="1" hangingPunct="1"/>
-            <a:endParaRPr lang="en-US" altLang="en-US" sz="2800" dirty="0"/>
+            <a:endParaRPr lang="en-GB" altLang="en-US" sz="2800" noProof="0" dirty="0"/>
           </a:p>
           <a:p>
             <a:pPr eaLnBrk="1" hangingPunct="1"/>
             <a:r>
-              <a:rPr lang="en-US" altLang="en-US" sz="2800" dirty="0"/>
+              <a:rPr lang="en-GB" altLang="en-US" sz="2800" noProof="0" dirty="0"/>
               <a:t>Influenced by many factors, </a:t>
             </a:r>
             <a:r>
-              <a:rPr lang="en-US" altLang="en-US" sz="2800" i="1" dirty="0"/>
+              <a:rPr lang="en-GB" altLang="en-US" sz="2800" i="1" noProof="0" dirty="0"/>
               <a:t>e.g.</a:t>
             </a:r>
           </a:p>
           <a:p>
             <a:pPr lvl="1" eaLnBrk="1" hangingPunct="1"/>
             <a:r>
-              <a:rPr lang="en-US" altLang="en-US" sz="2400" dirty="0"/>
+              <a:rPr lang="en-GB" altLang="en-US" sz="2400" noProof="0" dirty="0"/>
               <a:t>selection, </a:t>
             </a:r>
           </a:p>
           <a:p>
             <a:pPr lvl="1" eaLnBrk="1" hangingPunct="1"/>
             <a:r>
-              <a:rPr lang="en-US" altLang="en-US" sz="2400" dirty="0"/>
+              <a:rPr lang="en-GB" altLang="en-US" sz="2400" noProof="0" dirty="0"/>
               <a:t>the rate of recombination, </a:t>
             </a:r>
           </a:p>
           <a:p>
             <a:pPr lvl="1" eaLnBrk="1" hangingPunct="1"/>
             <a:r>
-              <a:rPr lang="en-US" altLang="en-US" sz="2400" dirty="0"/>
+              <a:rPr lang="en-GB" altLang="en-US" sz="2400" noProof="0" dirty="0"/>
               <a:t>genetic drift,</a:t>
             </a:r>
           </a:p>
           <a:p>
             <a:pPr lvl="1" eaLnBrk="1" hangingPunct="1"/>
             <a:r>
-              <a:rPr lang="en-US" altLang="en-US" sz="2400" dirty="0"/>
+              <a:rPr lang="en-GB" altLang="en-US" sz="2400" noProof="0" dirty="0"/>
               <a:t>population structure</a:t>
             </a:r>
           </a:p>
           <a:p>
             <a:pPr lvl="1" eaLnBrk="1" hangingPunct="1"/>
             <a:r>
-              <a:rPr lang="en-US" altLang="en-US" sz="2400" dirty="0"/>
+              <a:rPr lang="en-GB" altLang="en-US" sz="2400" noProof="0" dirty="0"/>
               <a:t>etc.</a:t>
             </a:r>
           </a:p>
           <a:p>
             <a:pPr eaLnBrk="1" hangingPunct="1"/>
-            <a:endParaRPr lang="en-US" altLang="en-US" sz="2800" dirty="0"/>
+            <a:endParaRPr lang="en-GB" altLang="en-US" sz="2800" noProof="0" dirty="0"/>
           </a:p>
           <a:p>
             <a:pPr eaLnBrk="1" hangingPunct="1"/>
             <a:r>
-              <a:rPr lang="en-US" altLang="en-US" sz="2800" dirty="0"/>
+              <a:rPr lang="en-GB" altLang="en-US" sz="2800" noProof="0" dirty="0"/>
               <a:t>As a result, the pattern of LD is a powerful signal of the population genetic processes that are structuring it.</a:t>
             </a:r>
-            <a:endParaRPr lang="en-GB" altLang="en-US" sz="2800" dirty="0"/>
           </a:p>
         </p:txBody>
       </p:sp>
@@ -18365,33 +18533,33 @@
           <a:p>
             <a:pPr eaLnBrk="1" hangingPunct="1"/>
             <a:r>
-              <a:rPr lang="en-US" altLang="en-US" sz="2800" dirty="0"/>
+              <a:rPr lang="en-GB" altLang="en-US" sz="2800" noProof="0" dirty="0"/>
               <a:t>Recombination mixes alleles</a:t>
             </a:r>
           </a:p>
           <a:p>
             <a:pPr lvl="1"/>
             <a:r>
-              <a:rPr lang="en-US" altLang="en-US" sz="2400" dirty="0"/>
+              <a:rPr lang="en-GB" altLang="en-US" sz="2400" noProof="0" dirty="0"/>
               <a:t>Creates random associations</a:t>
             </a:r>
           </a:p>
           <a:p>
             <a:r>
-              <a:rPr lang="en-US" altLang="en-US" sz="2800" dirty="0"/>
+              <a:rPr lang="en-GB" altLang="en-US" sz="2800" noProof="0" dirty="0"/>
               <a:t>Co-transmission and superinfections increase recombination</a:t>
             </a:r>
           </a:p>
           <a:p>
             <a:pPr lvl="1"/>
             <a:r>
-              <a:rPr lang="en-US" altLang="en-US" sz="2400" dirty="0"/>
+              <a:rPr lang="en-GB" altLang="en-US" sz="2400" noProof="0" dirty="0"/>
               <a:t>Lower LD</a:t>
             </a:r>
           </a:p>
           <a:p>
             <a:pPr lvl="1"/>
-            <a:endParaRPr lang="en-GB" altLang="en-US" sz="2800" dirty="0"/>
+            <a:endParaRPr lang="en-GB" altLang="en-US" sz="2800" noProof="0" dirty="0"/>
           </a:p>
         </p:txBody>
       </p:sp>
@@ -18648,66 +18816,65 @@
           <a:lstStyle/>
           <a:p>
             <a:pPr eaLnBrk="1" hangingPunct="1"/>
-            <a:endParaRPr lang="en-US" altLang="en-US" sz="2400" dirty="0"/>
+            <a:endParaRPr lang="en-GB" altLang="en-US" sz="2400" noProof="0" dirty="0"/>
           </a:p>
           <a:p>
             <a:pPr eaLnBrk="1" hangingPunct="1"/>
             <a:r>
-              <a:rPr lang="en-US" altLang="en-US" sz="2400" dirty="0"/>
+              <a:rPr lang="en-GB" altLang="en-US" sz="2400" noProof="0" dirty="0"/>
               <a:t>High LD usually signifies low transmission</a:t>
             </a:r>
           </a:p>
           <a:p>
             <a:pPr lvl="1"/>
             <a:r>
-              <a:rPr lang="en-US" altLang="en-US" sz="2400" dirty="0"/>
+              <a:rPr lang="en-GB" altLang="en-US" sz="2400" noProof="0" dirty="0"/>
               <a:t>Not much population mixing</a:t>
             </a:r>
           </a:p>
           <a:p>
             <a:pPr lvl="2"/>
             <a:r>
-              <a:rPr lang="en-US" altLang="en-US" dirty="0"/>
+              <a:rPr lang="en-GB" altLang="en-US" noProof="0" dirty="0"/>
               <a:t>Low recombination</a:t>
             </a:r>
           </a:p>
           <a:p>
-            <a:endParaRPr lang="en-US" altLang="en-US" sz="2400" dirty="0"/>
-          </a:p>
-          <a:p>
-            <a:r>
-              <a:rPr lang="en-US" altLang="en-US" sz="2400" dirty="0"/>
+            <a:endParaRPr lang="en-GB" altLang="en-US" sz="2400" noProof="0" dirty="0"/>
+          </a:p>
+          <a:p>
+            <a:r>
+              <a:rPr lang="en-GB" altLang="en-US" sz="2400" noProof="0" dirty="0"/>
               <a:t>Not perfect for this</a:t>
             </a:r>
           </a:p>
           <a:p>
             <a:pPr lvl="1"/>
             <a:r>
-              <a:rPr lang="en-US" altLang="en-US" sz="2400" dirty="0"/>
+              <a:rPr lang="en-GB" altLang="en-US" sz="2400" noProof="0" dirty="0"/>
               <a:t>Drug resistance increases LD</a:t>
             </a:r>
           </a:p>
           <a:p>
             <a:pPr lvl="2"/>
             <a:r>
-              <a:rPr lang="en-US" altLang="en-US" dirty="0"/>
+              <a:rPr lang="en-GB" altLang="en-US" noProof="0" dirty="0"/>
               <a:t>Selective sweeps</a:t>
             </a:r>
           </a:p>
           <a:p>
             <a:pPr lvl="1"/>
             <a:r>
-              <a:rPr lang="en-US" altLang="en-US" sz="2400" dirty="0"/>
+              <a:rPr lang="en-GB" altLang="en-US" sz="2400" noProof="0" dirty="0"/>
               <a:t>Inbreeding increases LD</a:t>
             </a:r>
           </a:p>
           <a:p>
             <a:pPr lvl="2"/>
             <a:r>
-              <a:rPr lang="en-US" altLang="en-US" dirty="0"/>
+              <a:rPr lang="en-GB" altLang="en-US" noProof="0" dirty="0"/>
               <a:t>High transmission but similar parasites</a:t>
             </a:r>
-            <a:endParaRPr lang="en-GB" altLang="en-US" dirty="0"/>
           </a:p>
         </p:txBody>
       </p:sp>
@@ -18903,38 +19070,37 @@
           <a:p>
             <a:pPr eaLnBrk="1" hangingPunct="1"/>
             <a:r>
-              <a:rPr lang="en-US" altLang="en-US" sz="1800" dirty="0"/>
+              <a:rPr lang="en-GB" altLang="en-US" sz="1800" noProof="0" dirty="0"/>
               <a:t>Primarily point mutations</a:t>
             </a:r>
           </a:p>
           <a:p>
             <a:pPr lvl="1"/>
             <a:r>
-              <a:rPr lang="en-US" altLang="en-US" sz="1800" dirty="0"/>
+              <a:rPr lang="en-GB" altLang="en-US" sz="1800" noProof="0" dirty="0"/>
               <a:t>A growing list as more discovered</a:t>
             </a:r>
           </a:p>
           <a:p>
             <a:pPr lvl="2"/>
             <a:r>
-              <a:rPr lang="en-US" altLang="en-US" sz="1600" dirty="0"/>
+              <a:rPr lang="en-GB" altLang="en-US" sz="1600" noProof="0" dirty="0"/>
               <a:t>WHO reports</a:t>
             </a:r>
           </a:p>
           <a:p>
             <a:pPr eaLnBrk="1" hangingPunct="1"/>
             <a:r>
-              <a:rPr lang="en-US" altLang="en-US" sz="1800" dirty="0"/>
+              <a:rPr lang="en-GB" altLang="en-US" sz="1800" noProof="0" dirty="0"/>
               <a:t>Prevalence differs between countries</a:t>
             </a:r>
           </a:p>
           <a:p>
             <a:pPr lvl="1"/>
             <a:r>
-              <a:rPr lang="en-US" altLang="en-US" sz="1800" dirty="0"/>
+              <a:rPr lang="en-GB" altLang="en-US" sz="1800" noProof="0" dirty="0"/>
               <a:t>K13 mutations very common in Rwanda</a:t>
             </a:r>
-            <a:endParaRPr lang="en-GB" altLang="en-US" sz="1800" dirty="0"/>
           </a:p>
         </p:txBody>
       </p:sp>
@@ -20188,35 +20354,34 @@
           <a:lstStyle/>
           <a:p>
             <a:pPr eaLnBrk="1" hangingPunct="1"/>
-            <a:endParaRPr lang="en-US" altLang="en-US" sz="2400" dirty="0"/>
+            <a:endParaRPr lang="en-GB" altLang="en-US" sz="2400" noProof="0" dirty="0"/>
           </a:p>
           <a:p>
             <a:pPr eaLnBrk="1" hangingPunct="1"/>
-            <a:endParaRPr lang="en-US" altLang="en-US" sz="2400" dirty="0"/>
+            <a:endParaRPr lang="en-GB" altLang="en-US" sz="2400" noProof="0" dirty="0"/>
           </a:p>
           <a:p>
             <a:pPr eaLnBrk="1" hangingPunct="1"/>
             <a:r>
-              <a:rPr lang="en-US" altLang="en-US" sz="2400" dirty="0"/>
+              <a:rPr lang="en-GB" altLang="en-US" sz="2400" noProof="0" dirty="0"/>
               <a:t>Prevalence differs between countries</a:t>
             </a:r>
           </a:p>
           <a:p>
             <a:pPr lvl="1"/>
             <a:r>
-              <a:rPr lang="en-US" altLang="en-US" sz="2000" dirty="0"/>
+              <a:rPr lang="en-GB" altLang="en-US" sz="2000" noProof="0" dirty="0"/>
               <a:t>K13 mutations very common in Rwanda</a:t>
             </a:r>
           </a:p>
           <a:p>
-            <a:endParaRPr lang="en-US" altLang="en-US" sz="2400" dirty="0"/>
-          </a:p>
-          <a:p>
-            <a:r>
-              <a:rPr lang="en-US" altLang="en-US" sz="2400" dirty="0"/>
+            <a:endParaRPr lang="en-GB" altLang="en-US" sz="2400" noProof="0" dirty="0"/>
+          </a:p>
+          <a:p>
+            <a:r>
+              <a:rPr lang="en-GB" altLang="en-US" sz="2400" noProof="0" dirty="0"/>
               <a:t>Can serve as epidemiological markers</a:t>
             </a:r>
-            <a:endParaRPr lang="en-GB" altLang="en-US" sz="2400" dirty="0"/>
           </a:p>
         </p:txBody>
       </p:sp>
@@ -20515,86 +20680,85 @@
           <a:p>
             <a:pPr eaLnBrk="1" hangingPunct="1"/>
             <a:r>
-              <a:rPr lang="en-US" altLang="en-US" sz="2400" dirty="0"/>
+              <a:rPr lang="en-GB" altLang="en-US" sz="2400" noProof="0" dirty="0"/>
               <a:t>Microsatellites (MS) used in the past for population structure</a:t>
             </a:r>
           </a:p>
           <a:p>
             <a:pPr lvl="1"/>
             <a:r>
-              <a:rPr lang="en-US" altLang="en-US" sz="2100" dirty="0"/>
+              <a:rPr lang="en-GB" altLang="en-US" sz="2100" noProof="0" dirty="0"/>
               <a:t>Medium resolution</a:t>
             </a:r>
           </a:p>
           <a:p>
             <a:pPr eaLnBrk="1" hangingPunct="1"/>
-            <a:endParaRPr lang="en-US" altLang="en-US" sz="2400" dirty="0"/>
+            <a:endParaRPr lang="en-GB" altLang="en-US" sz="2400" noProof="0" dirty="0"/>
           </a:p>
           <a:p>
             <a:pPr eaLnBrk="1" hangingPunct="1"/>
             <a:r>
-              <a:rPr lang="en-US" altLang="en-US" sz="2400" dirty="0"/>
+              <a:rPr lang="en-GB" altLang="en-US" sz="2400" noProof="0" dirty="0"/>
               <a:t>SNP barcoding better for determining populations</a:t>
             </a:r>
           </a:p>
           <a:p>
             <a:pPr lvl="1"/>
             <a:r>
-              <a:rPr lang="en-US" altLang="en-US" sz="2100" dirty="0"/>
+              <a:rPr lang="en-GB" altLang="en-US" sz="2100" noProof="0" dirty="0"/>
               <a:t>Need more SNPs than MS for resolution</a:t>
             </a:r>
           </a:p>
           <a:p>
             <a:pPr lvl="1"/>
             <a:r>
-              <a:rPr lang="en-US" altLang="en-US" sz="2100" dirty="0"/>
+              <a:rPr lang="en-GB" altLang="en-US" sz="2100" noProof="0" dirty="0"/>
               <a:t>29k used in recent African study</a:t>
             </a:r>
           </a:p>
           <a:p>
-            <a:endParaRPr lang="en-US" altLang="en-US" sz="2400" dirty="0"/>
-          </a:p>
-          <a:p>
-            <a:r>
-              <a:rPr lang="en-US" altLang="en-US" sz="2400" dirty="0"/>
+            <a:endParaRPr lang="en-GB" altLang="en-US" sz="2400" noProof="0" dirty="0"/>
+          </a:p>
+          <a:p>
+            <a:r>
+              <a:rPr lang="en-GB" altLang="en-US" sz="2400" noProof="0" dirty="0"/>
               <a:t>Country-specific signatures clear</a:t>
             </a:r>
           </a:p>
           <a:p>
             <a:pPr lvl="1"/>
             <a:r>
-              <a:rPr lang="en-US" altLang="en-US" sz="2100" dirty="0"/>
+              <a:rPr lang="en-GB" altLang="en-US" sz="2100" noProof="0" dirty="0"/>
               <a:t>Not so clear within country</a:t>
             </a:r>
           </a:p>
           <a:p>
             <a:pPr lvl="1"/>
             <a:r>
-              <a:rPr lang="en-US" altLang="en-US" sz="2100" dirty="0"/>
+              <a:rPr lang="en-GB" altLang="en-US" sz="2100" noProof="0" dirty="0"/>
               <a:t>Need locally validated barcodes</a:t>
             </a:r>
           </a:p>
           <a:p>
             <a:pPr lvl="2"/>
             <a:r>
-              <a:rPr lang="en-US" altLang="en-US" sz="1900" dirty="0"/>
+              <a:rPr lang="en-GB" altLang="en-US" sz="1900" noProof="0" dirty="0"/>
               <a:t>Biallelic</a:t>
             </a:r>
           </a:p>
           <a:p>
             <a:pPr lvl="2"/>
             <a:r>
-              <a:rPr lang="en-US" altLang="en-US" sz="1900" dirty="0"/>
+              <a:rPr lang="en-GB" altLang="en-US" sz="1900" noProof="0" dirty="0"/>
               <a:t>Minor allele frequency &gt;10%</a:t>
             </a:r>
           </a:p>
           <a:p>
             <a:pPr lvl="2"/>
             <a:r>
-              <a:rPr lang="en-US" altLang="en-US" sz="1900" dirty="0"/>
+              <a:rPr lang="en-GB" altLang="en-US" sz="1900" noProof="0" dirty="0"/>
               <a:t>Low LD</a:t>
             </a:r>
-            <a:endParaRPr lang="en-GB" altLang="en-US" sz="1900" dirty="0"/>
           </a:p>
         </p:txBody>
       </p:sp>
@@ -20830,115 +20994,107 @@
           <a:p>
             <a:pPr eaLnBrk="1" hangingPunct="1"/>
             <a:r>
-              <a:rPr lang="en-US" altLang="en-US" sz="2000" dirty="0"/>
+              <a:rPr lang="en-GB" altLang="en-US" sz="2000" noProof="0" dirty="0"/>
               <a:t>STRUCTURE</a:t>
             </a:r>
           </a:p>
           <a:p>
             <a:pPr lvl="1"/>
             <a:r>
-              <a:rPr lang="en-US" altLang="en-US" sz="1800" dirty="0"/>
-              <a:t>Bayesian </a:t>
-            </a:r>
-            <a:r>
-              <a:rPr lang="en-US" altLang="en-US" sz="1800" dirty="0" err="1"/>
-              <a:t>programme</a:t>
-            </a:r>
-            <a:r>
-              <a:rPr lang="en-US" altLang="en-US" sz="1800" dirty="0"/>
-              <a:t> for determining population structures</a:t>
+              <a:rPr lang="en-GB" altLang="en-US" sz="1800" noProof="0" dirty="0"/>
+              <a:t>Bayesian programme for determining population structures</a:t>
             </a:r>
           </a:p>
           <a:p>
             <a:pPr lvl="2"/>
             <a:r>
-              <a:rPr lang="en-US" altLang="en-US" sz="1600" dirty="0" err="1"/>
+              <a:rPr lang="en-GB" altLang="en-US" sz="1600" noProof="0" dirty="0" err="1"/>
               <a:t>fastSTRUCTURE</a:t>
             </a:r>
             <a:r>
-              <a:rPr lang="en-US" altLang="en-US" sz="1600" dirty="0"/>
+              <a:rPr lang="en-GB" altLang="en-US" sz="1600" noProof="0" dirty="0"/>
               <a:t> can be used on large SNP datasets</a:t>
             </a:r>
           </a:p>
           <a:p>
             <a:pPr lvl="2"/>
             <a:r>
-              <a:rPr lang="en-US" altLang="en-US" sz="1600" dirty="0"/>
+              <a:rPr lang="en-GB" altLang="en-US" sz="1600" noProof="0" dirty="0"/>
               <a:t>Useable on MS, SNPs and other typing markers</a:t>
             </a:r>
-            <a:endParaRPr lang="en-US" altLang="en-US" sz="1800" dirty="0"/>
+            <a:endParaRPr lang="en-GB" altLang="en-US" sz="1800" noProof="0" dirty="0"/>
           </a:p>
           <a:p>
             <a:pPr lvl="1"/>
             <a:r>
-              <a:rPr lang="en-US" altLang="en-US" sz="1800" dirty="0"/>
+              <a:rPr lang="en-GB" altLang="en-US" sz="1800" noProof="0" dirty="0"/>
               <a:t>Infers populations based on allele frequencies</a:t>
             </a:r>
           </a:p>
           <a:p>
             <a:pPr lvl="1"/>
             <a:r>
-              <a:rPr lang="en-US" altLang="en-US" sz="1800" dirty="0"/>
+              <a:rPr lang="en-GB" altLang="en-US" sz="1800" noProof="0" dirty="0"/>
               <a:t>Can assess presence of individuals in given structured populations</a:t>
             </a:r>
           </a:p>
           <a:p>
             <a:pPr lvl="1"/>
             <a:r>
-              <a:rPr lang="en-US" altLang="en-US" sz="1800" dirty="0"/>
+              <a:rPr lang="en-GB" altLang="en-US" sz="1800" noProof="0" dirty="0"/>
               <a:t>Combine with phylogenetics to look for population spread</a:t>
             </a:r>
-            <a:endParaRPr lang="en-US" altLang="en-US" sz="2000" dirty="0"/>
-          </a:p>
-          <a:p>
-            <a:endParaRPr lang="en-US" altLang="en-US" sz="2000" dirty="0"/>
-          </a:p>
-          <a:p>
-            <a:r>
-              <a:rPr lang="en-US" altLang="en-US" sz="2000" dirty="0" err="1"/>
+            <a:endParaRPr lang="en-GB" altLang="en-US" sz="2000" noProof="0" dirty="0"/>
+          </a:p>
+          <a:p>
+            <a:endParaRPr lang="en-GB" altLang="en-US" sz="2000" noProof="0" dirty="0"/>
+          </a:p>
+          <a:p>
+            <a:r>
+              <a:rPr lang="en-GB" altLang="en-US" sz="2000" noProof="0" dirty="0" err="1"/>
               <a:t>F</a:t>
             </a:r>
             <a:r>
-              <a:rPr lang="en-US" altLang="en-US" sz="2000" baseline="-25000" dirty="0" err="1"/>
+              <a:rPr lang="en-GB" altLang="en-US" sz="2000" baseline="-25000" noProof="0" dirty="0" err="1"/>
               <a:t>st</a:t>
             </a:r>
-            <a:endParaRPr lang="en-US" altLang="en-US" sz="2000" baseline="-25000" dirty="0"/>
+            <a:endParaRPr lang="en-GB" altLang="en-US" sz="2000" baseline="-25000" noProof="0" dirty="0"/>
           </a:p>
           <a:p>
             <a:pPr lvl="1"/>
             <a:r>
-              <a:rPr lang="en-US" altLang="en-US" sz="1800" dirty="0"/>
+              <a:rPr lang="en-GB" altLang="en-US" sz="1800" noProof="0" dirty="0"/>
               <a:t>How different populations are base don genetic determinants</a:t>
             </a:r>
           </a:p>
           <a:p>
             <a:pPr lvl="1"/>
             <a:r>
-              <a:rPr lang="en-US" altLang="en-US" sz="1800" dirty="0"/>
+              <a:rPr lang="en-GB" altLang="en-US" sz="1800" noProof="0" dirty="0"/>
               <a:t>Can also be a measure of how much a SNP/MS segregates a population</a:t>
             </a:r>
           </a:p>
           <a:p>
             <a:pPr lvl="2"/>
             <a:r>
-              <a:rPr lang="en-US" altLang="en-US" sz="1600" dirty="0" err="1"/>
+              <a:rPr lang="en-GB" altLang="en-US" sz="1600" noProof="0" dirty="0" err="1"/>
               <a:t>F</a:t>
             </a:r>
             <a:r>
-              <a:rPr lang="en-US" altLang="en-US" sz="1600" baseline="-25000" dirty="0" err="1"/>
+              <a:rPr lang="en-GB" altLang="en-US" sz="1600" baseline="-25000" noProof="0" dirty="0" err="1"/>
               <a:t>st</a:t>
             </a:r>
             <a:r>
-              <a:rPr lang="en-US" altLang="en-US" sz="1600" dirty="0"/>
+              <a:rPr lang="en-GB" altLang="en-US" sz="1600" noProof="0" dirty="0"/>
               <a:t>=1 means complete segregation</a:t>
             </a:r>
           </a:p>
           <a:p>
             <a:pPr lvl="2"/>
-            <a:endParaRPr lang="en-US" altLang="en-US" dirty="0"/>
-          </a:p>
-          <a:p>
-            <a:endParaRPr lang="en-GB" altLang="en-US" sz="2000" dirty="0"/>
+            <a:endParaRPr lang="en-GB" altLang="en-US" noProof="0" dirty="0"/>
+          </a:p>
+          <a:p>
+            <a:endParaRPr lang="en-GB" altLang="en-US" sz="2000" noProof="0" dirty="0"/>
           </a:p>
         </p:txBody>
       </p:sp>
@@ -21108,17 +21264,55 @@
             <a:pPr algn="ctr"/>
             <a:r>
               <a:rPr lang="en-US" dirty="0"/>
-              <a:t>Learning outcomes</a:t>
-            </a:r>
-          </a:p>
-        </p:txBody>
-      </p:sp>
-      <p:sp>
-        <p:nvSpPr>
-          <p:cNvPr id="9" name="Tijdelijke aanduiding voor inhoud 5">
-            <a:extLst>
-              <a:ext uri="{FF2B5EF4-FFF2-40B4-BE49-F238E27FC236}">
-                <a16:creationId xmlns:a16="http://schemas.microsoft.com/office/drawing/2014/main" id="{236654F0-D29E-AE4F-A966-9762A2AB84EB}"/>
+              <a:t>Bioinformatics for </a:t>
+            </a:r>
+            <a:r>
+              <a:rPr lang="en-US" i="1" dirty="0"/>
+              <a:t>Plasmodium</a:t>
+            </a:r>
+            <a:endParaRPr lang="en-US" dirty="0"/>
+          </a:p>
+        </p:txBody>
+      </p:sp>
+      <p:sp>
+        <p:nvSpPr>
+          <p:cNvPr id="2" name="TextBox 1">
+            <a:extLst>
+              <a:ext uri="{FF2B5EF4-FFF2-40B4-BE49-F238E27FC236}">
+                <a16:creationId xmlns:a16="http://schemas.microsoft.com/office/drawing/2014/main" id="{A18A5017-86B8-8244-A6D6-22EB3CBB778D}"/>
+              </a:ext>
+            </a:extLst>
+          </p:cNvPr>
+          <p:cNvSpPr txBox="1"/>
+          <p:nvPr/>
+        </p:nvSpPr>
+        <p:spPr>
+          <a:xfrm>
+            <a:off x="1427356" y="3044283"/>
+            <a:ext cx="0" cy="0"/>
+          </a:xfrm>
+          <a:prstGeom prst="rect">
+            <a:avLst/>
+          </a:prstGeom>
+          <a:noFill/>
+        </p:spPr>
+        <p:txBody>
+          <a:bodyPr wrap="none" lIns="0" tIns="0" rIns="0" bIns="0" rtlCol="0" anchor="b" anchorCtr="0">
+            <a:normAutofit fontScale="25000" lnSpcReduction="20000"/>
+          </a:bodyPr>
+          <a:lstStyle/>
+          <a:p>
+            <a:pPr algn="r"/>
+            <a:endParaRPr lang="en-US" dirty="0"/>
+          </a:p>
+        </p:txBody>
+      </p:sp>
+      <p:sp>
+        <p:nvSpPr>
+          <p:cNvPr id="12" name="Tijdelijke aanduiding voor inhoud 5">
+            <a:extLst>
+              <a:ext uri="{FF2B5EF4-FFF2-40B4-BE49-F238E27FC236}">
+                <a16:creationId xmlns:a16="http://schemas.microsoft.com/office/drawing/2014/main" id="{A42194A0-DD2D-9B22-F5E0-5080A8E6AF27}"/>
               </a:ext>
             </a:extLst>
           </p:cNvPr>
@@ -21131,112 +21325,156 @@
         </p:nvSpPr>
         <p:spPr>
           <a:xfrm>
-            <a:off x="987972" y="1222626"/>
-            <a:ext cx="10657490" cy="5140548"/>
+            <a:off x="1107351" y="1262718"/>
+            <a:ext cx="10906849" cy="5537887"/>
           </a:xfrm>
         </p:spPr>
         <p:txBody>
           <a:bodyPr>
-            <a:normAutofit fontScale="92500" lnSpcReduction="20000"/>
+            <a:noAutofit/>
           </a:bodyPr>
           <a:lstStyle/>
           <a:p>
-            <a:r>
-              <a:rPr lang="en-CA" dirty="0"/>
-              <a:t>Classify </a:t>
-            </a:r>
-            <a:r>
-              <a:rPr lang="en-CA" i="1" dirty="0"/>
-              <a:t>Plasmodium</a:t>
-            </a:r>
-            <a:r>
-              <a:rPr lang="en-CA" dirty="0"/>
-              <a:t> species, specifically those that infect humans</a:t>
-            </a:r>
-          </a:p>
-          <a:p>
-            <a:endParaRPr lang="en-CA" dirty="0"/>
-          </a:p>
-          <a:p>
-            <a:r>
-              <a:rPr lang="en-CA" dirty="0"/>
-              <a:t>Describe the genetic structure of </a:t>
-            </a:r>
-            <a:r>
-              <a:rPr lang="en-CA" i="1" dirty="0"/>
-              <a:t>Plasmodium</a:t>
-            </a:r>
-            <a:r>
-              <a:rPr lang="en-CA" dirty="0"/>
-              <a:t> across the three structures</a:t>
-            </a:r>
-          </a:p>
-          <a:p>
-            <a:endParaRPr lang="en-CA" dirty="0"/>
-          </a:p>
-          <a:p>
-            <a:r>
-              <a:rPr lang="en-CA" dirty="0"/>
-              <a:t>Compare amplicon and genome sequencing approaches</a:t>
-            </a:r>
-          </a:p>
-          <a:p>
-            <a:endParaRPr lang="en-CA" dirty="0"/>
-          </a:p>
-          <a:p>
-            <a:r>
-              <a:rPr lang="en-CA" dirty="0"/>
-              <a:t>Describe linkage disequilibrium and its uses in </a:t>
-            </a:r>
-            <a:r>
-              <a:rPr lang="en-CA" i="1" dirty="0"/>
-              <a:t>Plasmodium</a:t>
-            </a:r>
-            <a:r>
-              <a:rPr lang="en-CA" dirty="0"/>
-              <a:t> epidemiology</a:t>
-            </a:r>
-          </a:p>
-          <a:p>
-            <a:endParaRPr lang="en-CA" dirty="0"/>
-          </a:p>
-          <a:p>
-            <a:r>
-              <a:rPr lang="en-CA" dirty="0"/>
-              <a:t>Recognise the key genes involved in </a:t>
-            </a:r>
-            <a:r>
-              <a:rPr lang="en-CA" i="1" dirty="0"/>
-              <a:t>Plasmodium</a:t>
-            </a:r>
-            <a:r>
-              <a:rPr lang="en-CA" dirty="0"/>
-              <a:t> drug resistance</a:t>
-            </a:r>
-          </a:p>
-          <a:p>
-            <a:endParaRPr lang="en-CA" dirty="0"/>
-          </a:p>
-          <a:p>
-            <a:r>
-              <a:rPr lang="en-CA" dirty="0"/>
-              <a:t>State the primary data types and computational approaches for determining </a:t>
-            </a:r>
-            <a:r>
-              <a:rPr lang="en-CA" i="1" dirty="0"/>
-              <a:t>Plasmodium</a:t>
-            </a:r>
-            <a:r>
-              <a:rPr lang="en-CA" dirty="0"/>
-              <a:t> population structure</a:t>
-            </a:r>
+            <a:pPr eaLnBrk="1" hangingPunct="1"/>
+            <a:r>
+              <a:rPr lang="en-GB" altLang="en-US" sz="1800" noProof="0" dirty="0"/>
+              <a:t>Still in its infancy</a:t>
+            </a:r>
+            <a:endParaRPr lang="en-GB" altLang="en-US" sz="1800" dirty="0"/>
+          </a:p>
+          <a:p>
+            <a:pPr eaLnBrk="1" hangingPunct="1"/>
+            <a:r>
+              <a:rPr lang="en-GB" altLang="en-US" sz="1800" noProof="0" dirty="0"/>
+              <a:t>Assembling microbial eukaryotic genomes is more difficult than bacteria and viruses</a:t>
+            </a:r>
+          </a:p>
+          <a:p>
+            <a:pPr lvl="1"/>
+            <a:r>
+              <a:rPr lang="en-GB" altLang="en-US" sz="1600" dirty="0"/>
+              <a:t>Larger</a:t>
+            </a:r>
+          </a:p>
+          <a:p>
+            <a:pPr lvl="1"/>
+            <a:r>
+              <a:rPr lang="en-GB" altLang="en-US" sz="1600" noProof="0" dirty="0"/>
+              <a:t>More complex (multiple chromosomes, diploid stages)</a:t>
+            </a:r>
+          </a:p>
+          <a:p>
+            <a:pPr lvl="1"/>
+            <a:r>
+              <a:rPr lang="en-GB" altLang="en-US" sz="1600" dirty="0"/>
+              <a:t>More features (introns etc)</a:t>
+            </a:r>
+            <a:endParaRPr lang="en-GB" altLang="en-US" sz="1800" noProof="0" dirty="0"/>
+          </a:p>
+          <a:p>
+            <a:r>
+              <a:rPr lang="en-GB" altLang="en-US" sz="1800" noProof="0" dirty="0"/>
+              <a:t>Host contamination more difficult to spot</a:t>
+            </a:r>
+          </a:p>
+          <a:p>
+            <a:pPr lvl="1"/>
+            <a:r>
+              <a:rPr lang="en-GB" altLang="en-US" sz="1600" dirty="0"/>
+              <a:t>Many orthologs between microbial eukaryotes and hosts</a:t>
+            </a:r>
+            <a:endParaRPr lang="en-GB" altLang="en-US" sz="1800" noProof="0" dirty="0"/>
+          </a:p>
+          <a:p>
+            <a:r>
+              <a:rPr lang="en-GB" altLang="en-US" sz="1800" dirty="0"/>
+              <a:t>Easy to use pipelines don’t exist</a:t>
+            </a:r>
+          </a:p>
+          <a:p>
+            <a:pPr lvl="1"/>
+            <a:r>
+              <a:rPr lang="en-GB" altLang="en-US" sz="1600" noProof="0" dirty="0"/>
+              <a:t>Slowly being built</a:t>
+            </a:r>
+          </a:p>
+          <a:p>
+            <a:pPr lvl="1"/>
+            <a:r>
+              <a:rPr lang="en-GB" altLang="en-US" sz="1600" dirty="0"/>
+              <a:t>Mainly UNIX/R-based with multiple steps</a:t>
+            </a:r>
+            <a:endParaRPr lang="en-GB" altLang="en-US" sz="1800" noProof="0" dirty="0"/>
+          </a:p>
+          <a:p>
+            <a:r>
+              <a:rPr lang="en-GB" altLang="en-US" sz="1800" noProof="0" dirty="0"/>
+              <a:t>Markers of resistance and transmission not fully known</a:t>
+            </a:r>
+          </a:p>
+          <a:p>
+            <a:pPr lvl="1"/>
+            <a:r>
+              <a:rPr lang="en-GB" altLang="en-US" sz="1600" dirty="0"/>
+              <a:t>SNP panels</a:t>
+            </a:r>
+          </a:p>
+          <a:p>
+            <a:pPr lvl="1"/>
+            <a:r>
+              <a:rPr lang="en-GB" altLang="en-US" sz="1600" noProof="0" dirty="0"/>
+              <a:t>WGS approaches</a:t>
+            </a:r>
+          </a:p>
+          <a:p>
+            <a:pPr lvl="1"/>
+            <a:r>
+              <a:rPr lang="en-GB" altLang="en-US" sz="1600" dirty="0"/>
+              <a:t>Methylation contributions</a:t>
+            </a:r>
+          </a:p>
+          <a:p>
+            <a:r>
+              <a:rPr lang="en-GB" altLang="en-US" sz="2000" noProof="0" dirty="0" err="1"/>
+              <a:t>PlasmodDB</a:t>
+            </a:r>
+            <a:r>
+              <a:rPr lang="en-GB" altLang="en-US" sz="2000" noProof="0" dirty="0"/>
+              <a:t> is a good resource to use</a:t>
+            </a:r>
+          </a:p>
+          <a:p>
+            <a:pPr lvl="1"/>
+            <a:r>
+              <a:rPr lang="en-GB" altLang="en-US" sz="1600" noProof="0" dirty="0"/>
+              <a:t>https://</a:t>
+            </a:r>
+            <a:r>
+              <a:rPr lang="en-GB" altLang="en-US" sz="1600" noProof="0" dirty="0" err="1"/>
+              <a:t>plasmodb.org</a:t>
+            </a:r>
+            <a:r>
+              <a:rPr lang="en-GB" altLang="en-US" sz="1600" noProof="0" dirty="0"/>
+              <a:t>/</a:t>
+            </a:r>
+            <a:r>
+              <a:rPr lang="en-GB" altLang="en-US" sz="1600" noProof="0" dirty="0" err="1"/>
+              <a:t>plasmo</a:t>
+            </a:r>
+            <a:r>
+              <a:rPr lang="en-GB" altLang="en-US" sz="1600" noProof="0" dirty="0"/>
+              <a:t>/app</a:t>
+            </a:r>
+          </a:p>
+          <a:p>
+            <a:endParaRPr lang="en-GB" altLang="en-US" sz="1800" noProof="0" dirty="0"/>
           </a:p>
         </p:txBody>
       </p:sp>
     </p:spTree>
     <p:extLst>
       <p:ext uri="{BB962C8B-B14F-4D97-AF65-F5344CB8AC3E}">
-        <p14:creationId xmlns:p14="http://schemas.microsoft.com/office/powerpoint/2010/main" val="3116343297"/>
+        <p14:creationId xmlns:p14="http://schemas.microsoft.com/office/powerpoint/2010/main" val="3401929190"/>
       </p:ext>
     </p:extLst>
   </p:cSld>
@@ -21347,92 +21585,92 @@
           <a:lstStyle/>
           <a:p>
             <a:r>
-              <a:rPr lang="en-CA" dirty="0"/>
+              <a:rPr lang="en-GB" noProof="0" dirty="0"/>
               <a:t>Classify </a:t>
             </a:r>
             <a:r>
-              <a:rPr lang="en-CA" i="1" dirty="0"/>
+              <a:rPr lang="en-GB" i="1" noProof="0" dirty="0"/>
               <a:t>Plasmodium</a:t>
             </a:r>
             <a:r>
-              <a:rPr lang="en-CA" dirty="0"/>
+              <a:rPr lang="en-GB" noProof="0" dirty="0"/>
               <a:t> species, specifically those that infect humans</a:t>
             </a:r>
           </a:p>
           <a:p>
-            <a:endParaRPr lang="en-CA" dirty="0"/>
-          </a:p>
-          <a:p>
-            <a:r>
-              <a:rPr lang="en-CA" dirty="0"/>
+            <a:endParaRPr lang="en-GB" noProof="0" dirty="0"/>
+          </a:p>
+          <a:p>
+            <a:r>
+              <a:rPr lang="en-GB" noProof="0" dirty="0"/>
               <a:t>Describe the genetic structure of </a:t>
             </a:r>
             <a:r>
-              <a:rPr lang="en-CA" i="1" dirty="0"/>
+              <a:rPr lang="en-GB" i="1" noProof="0" dirty="0"/>
               <a:t>Plasmodium</a:t>
             </a:r>
             <a:r>
-              <a:rPr lang="en-CA" dirty="0"/>
+              <a:rPr lang="en-GB" noProof="0" dirty="0"/>
               <a:t> across the three structures</a:t>
             </a:r>
           </a:p>
           <a:p>
-            <a:endParaRPr lang="en-CA" dirty="0"/>
-          </a:p>
-          <a:p>
-            <a:r>
-              <a:rPr lang="en-CA" dirty="0"/>
+            <a:endParaRPr lang="en-GB" noProof="0" dirty="0"/>
+          </a:p>
+          <a:p>
+            <a:r>
+              <a:rPr lang="en-GB" noProof="0" dirty="0"/>
               <a:t>Compare amplicon and genome sequencing approaches</a:t>
             </a:r>
           </a:p>
           <a:p>
-            <a:endParaRPr lang="en-CA" dirty="0"/>
-          </a:p>
-          <a:p>
-            <a:r>
-              <a:rPr lang="en-CA" dirty="0"/>
+            <a:endParaRPr lang="en-GB" noProof="0" dirty="0"/>
+          </a:p>
+          <a:p>
+            <a:r>
+              <a:rPr lang="en-GB" noProof="0" dirty="0"/>
               <a:t>Describe linkage disequilibrium and its uses in </a:t>
             </a:r>
             <a:r>
-              <a:rPr lang="en-CA" i="1" dirty="0"/>
+              <a:rPr lang="en-GB" i="1" noProof="0" dirty="0"/>
               <a:t>Plasmodium</a:t>
             </a:r>
             <a:r>
-              <a:rPr lang="en-CA" dirty="0"/>
+              <a:rPr lang="en-GB" noProof="0" dirty="0"/>
               <a:t> epidemiology</a:t>
             </a:r>
           </a:p>
           <a:p>
-            <a:endParaRPr lang="en-CA" dirty="0"/>
-          </a:p>
-          <a:p>
-            <a:r>
-              <a:rPr lang="en-CA" dirty="0"/>
+            <a:endParaRPr lang="en-GB" noProof="0" dirty="0"/>
+          </a:p>
+          <a:p>
+            <a:r>
+              <a:rPr lang="en-GB" noProof="0" dirty="0"/>
               <a:t>Recognise the key genes involved in </a:t>
             </a:r>
             <a:r>
-              <a:rPr lang="en-CA" i="1" dirty="0"/>
+              <a:rPr lang="en-GB" i="1" noProof="0" dirty="0"/>
               <a:t>Plasmodium</a:t>
             </a:r>
             <a:r>
-              <a:rPr lang="en-CA" dirty="0"/>
+              <a:rPr lang="en-GB" noProof="0" dirty="0"/>
               <a:t> drug resistance</a:t>
             </a:r>
           </a:p>
           <a:p>
-            <a:endParaRPr lang="en-CA" dirty="0"/>
-          </a:p>
-          <a:p>
-            <a:r>
-              <a:rPr lang="en-CA" dirty="0"/>
+            <a:endParaRPr lang="en-GB" noProof="0" dirty="0"/>
+          </a:p>
+          <a:p>
+            <a:r>
+              <a:rPr lang="en-GB" noProof="0" dirty="0"/>
               <a:t>State the primary data types and computational approaches for determining </a:t>
             </a:r>
             <a:r>
-              <a:rPr lang="en-CA" i="1" dirty="0"/>
+              <a:rPr lang="en-GB" i="1" noProof="0" dirty="0"/>
               <a:t>Plasmodium</a:t>
             </a:r>
             <a:r>
-              <a:rPr lang="en-CA" dirty="0"/>
+              <a:rPr lang="en-GB" noProof="0" dirty="0"/>
               <a:t> population structure</a:t>
             </a:r>
           </a:p>
@@ -21442,6 +21680,211 @@
     <p:extLst>
       <p:ext uri="{BB962C8B-B14F-4D97-AF65-F5344CB8AC3E}">
         <p14:creationId xmlns:p14="http://schemas.microsoft.com/office/powerpoint/2010/main" val="3418174511"/>
+      </p:ext>
+    </p:extLst>
+  </p:cSld>
+  <p:clrMapOvr>
+    <a:masterClrMapping/>
+  </p:clrMapOvr>
+</p:sld>
+</file>
+
+<file path=ppt/slides/slide20.xml><?xml version="1.0" encoding="utf-8"?>
+<p:sld xmlns:a="http://schemas.openxmlformats.org/drawingml/2006/main" xmlns:r="http://schemas.openxmlformats.org/officeDocument/2006/relationships" xmlns:p="http://schemas.openxmlformats.org/presentationml/2006/main">
+  <p:cSld>
+    <p:spTree>
+      <p:nvGrpSpPr>
+        <p:cNvPr id="1" name=""/>
+        <p:cNvGrpSpPr/>
+        <p:nvPr/>
+      </p:nvGrpSpPr>
+      <p:grpSpPr>
+        <a:xfrm>
+          <a:off x="0" y="0"/>
+          <a:ext cx="0" cy="0"/>
+          <a:chOff x="0" y="0"/>
+          <a:chExt cx="0" cy="0"/>
+        </a:xfrm>
+      </p:grpSpPr>
+      <p:sp>
+        <p:nvSpPr>
+          <p:cNvPr id="8" name="Title 1">
+            <a:extLst>
+              <a:ext uri="{FF2B5EF4-FFF2-40B4-BE49-F238E27FC236}">
+                <a16:creationId xmlns:a16="http://schemas.microsoft.com/office/drawing/2014/main" id="{551F150B-CD36-EC43-A80B-C4F967B90C86}"/>
+              </a:ext>
+            </a:extLst>
+          </p:cNvPr>
+          <p:cNvSpPr txBox="1">
+            <a:spLocks/>
+          </p:cNvSpPr>
+          <p:nvPr/>
+        </p:nvSpPr>
+        <p:spPr>
+          <a:xfrm>
+            <a:off x="442912" y="444398"/>
+            <a:ext cx="11306176" cy="681875"/>
+          </a:xfrm>
+          <a:prstGeom prst="rect">
+            <a:avLst/>
+          </a:prstGeom>
+        </p:spPr>
+        <p:txBody>
+          <a:bodyPr vert="horz" lIns="0" tIns="45720" rIns="91440" bIns="45720" rtlCol="0" anchor="ctr" anchorCtr="0">
+            <a:normAutofit fontScale="90000" lnSpcReduction="10000"/>
+          </a:bodyPr>
+          <a:lstStyle>
+            <a:lvl1pPr algn="l" defTabSz="914400" rtl="0" eaLnBrk="1" latinLnBrk="0" hangingPunct="1">
+              <a:lnSpc>
+                <a:spcPct val="100000"/>
+              </a:lnSpc>
+              <a:spcBef>
+                <a:spcPct val="0"/>
+              </a:spcBef>
+              <a:buNone/>
+              <a:defRPr sz="4400" b="1" kern="1200">
+                <a:solidFill>
+                  <a:srgbClr val="E6005B"/>
+                </a:solidFill>
+                <a:latin typeface="Arial" panose="020B0604020202020204" pitchFamily="34" charset="0"/>
+                <a:ea typeface="+mj-ea"/>
+                <a:cs typeface="Arial" panose="020B0604020202020204" pitchFamily="34" charset="0"/>
+              </a:defRPr>
+            </a:lvl1pPr>
+          </a:lstStyle>
+          <a:p>
+            <a:pPr algn="ctr"/>
+            <a:r>
+              <a:rPr lang="en-US" dirty="0"/>
+              <a:t>Learning outcomes</a:t>
+            </a:r>
+          </a:p>
+        </p:txBody>
+      </p:sp>
+      <p:sp>
+        <p:nvSpPr>
+          <p:cNvPr id="9" name="Tijdelijke aanduiding voor inhoud 5">
+            <a:extLst>
+              <a:ext uri="{FF2B5EF4-FFF2-40B4-BE49-F238E27FC236}">
+                <a16:creationId xmlns:a16="http://schemas.microsoft.com/office/drawing/2014/main" id="{236654F0-D29E-AE4F-A966-9762A2AB84EB}"/>
+              </a:ext>
+            </a:extLst>
+          </p:cNvPr>
+          <p:cNvSpPr>
+            <a:spLocks noGrp="1"/>
+          </p:cNvSpPr>
+          <p:nvPr>
+            <p:ph idx="1"/>
+          </p:nvPr>
+        </p:nvSpPr>
+        <p:spPr>
+          <a:xfrm>
+            <a:off x="987972" y="1222626"/>
+            <a:ext cx="10657490" cy="5140548"/>
+          </a:xfrm>
+        </p:spPr>
+        <p:txBody>
+          <a:bodyPr>
+            <a:normAutofit fontScale="92500" lnSpcReduction="20000"/>
+          </a:bodyPr>
+          <a:lstStyle/>
+          <a:p>
+            <a:r>
+              <a:rPr lang="en-GB" noProof="0" dirty="0"/>
+              <a:t>Classify </a:t>
+            </a:r>
+            <a:r>
+              <a:rPr lang="en-GB" i="1" noProof="0" dirty="0"/>
+              <a:t>Plasmodium</a:t>
+            </a:r>
+            <a:r>
+              <a:rPr lang="en-GB" noProof="0" dirty="0"/>
+              <a:t> species, specifically those that infect humans</a:t>
+            </a:r>
+          </a:p>
+          <a:p>
+            <a:endParaRPr lang="en-GB" noProof="0" dirty="0"/>
+          </a:p>
+          <a:p>
+            <a:r>
+              <a:rPr lang="en-GB" noProof="0" dirty="0"/>
+              <a:t>Describe the genetic structure of </a:t>
+            </a:r>
+            <a:r>
+              <a:rPr lang="en-GB" i="1" noProof="0" dirty="0"/>
+              <a:t>Plasmodium</a:t>
+            </a:r>
+            <a:r>
+              <a:rPr lang="en-GB" noProof="0" dirty="0"/>
+              <a:t> across the three structures</a:t>
+            </a:r>
+          </a:p>
+          <a:p>
+            <a:endParaRPr lang="en-GB" noProof="0" dirty="0"/>
+          </a:p>
+          <a:p>
+            <a:r>
+              <a:rPr lang="en-GB" noProof="0" dirty="0"/>
+              <a:t>Compare amplicon and genome sequencing approaches</a:t>
+            </a:r>
+          </a:p>
+          <a:p>
+            <a:endParaRPr lang="en-GB" noProof="0" dirty="0"/>
+          </a:p>
+          <a:p>
+            <a:r>
+              <a:rPr lang="en-GB" noProof="0" dirty="0"/>
+              <a:t>Describe linkage disequilibrium and its uses in </a:t>
+            </a:r>
+            <a:r>
+              <a:rPr lang="en-GB" i="1" noProof="0" dirty="0"/>
+              <a:t>Plasmodium</a:t>
+            </a:r>
+            <a:r>
+              <a:rPr lang="en-GB" noProof="0" dirty="0"/>
+              <a:t> epidemiology</a:t>
+            </a:r>
+          </a:p>
+          <a:p>
+            <a:endParaRPr lang="en-GB" noProof="0" dirty="0"/>
+          </a:p>
+          <a:p>
+            <a:r>
+              <a:rPr lang="en-GB" noProof="0" dirty="0"/>
+              <a:t>Recognise the key genes involved in </a:t>
+            </a:r>
+            <a:r>
+              <a:rPr lang="en-GB" i="1" noProof="0" dirty="0"/>
+              <a:t>Plasmodium</a:t>
+            </a:r>
+            <a:r>
+              <a:rPr lang="en-GB" noProof="0" dirty="0"/>
+              <a:t> drug resistance</a:t>
+            </a:r>
+          </a:p>
+          <a:p>
+            <a:endParaRPr lang="en-GB" noProof="0" dirty="0"/>
+          </a:p>
+          <a:p>
+            <a:r>
+              <a:rPr lang="en-GB" noProof="0" dirty="0"/>
+              <a:t>State the primary data types and computational approaches for determining </a:t>
+            </a:r>
+            <a:r>
+              <a:rPr lang="en-GB" i="1" noProof="0" dirty="0"/>
+              <a:t>Plasmodium</a:t>
+            </a:r>
+            <a:r>
+              <a:rPr lang="en-GB" noProof="0" dirty="0"/>
+              <a:t> population structure</a:t>
+            </a:r>
+          </a:p>
+        </p:txBody>
+      </p:sp>
+    </p:spTree>
+    <p:extLst>
+      <p:ext uri="{BB962C8B-B14F-4D97-AF65-F5344CB8AC3E}">
+        <p14:creationId xmlns:p14="http://schemas.microsoft.com/office/powerpoint/2010/main" val="3116343297"/>
       </p:ext>
     </p:extLst>
   </p:cSld>
@@ -22380,89 +22823,88 @@
           <a:lstStyle/>
           <a:p>
             <a:r>
-              <a:rPr lang="en-US" sz="2400" dirty="0"/>
+              <a:rPr lang="en-GB" sz="2400" noProof="0" dirty="0"/>
               <a:t>There are &gt;100 species of </a:t>
             </a:r>
             <a:r>
-              <a:rPr lang="en-US" sz="2400" i="1" dirty="0"/>
+              <a:rPr lang="en-GB" sz="2400" i="1" noProof="0" dirty="0"/>
               <a:t>Plasmodium</a:t>
             </a:r>
             <a:r>
-              <a:rPr lang="en-US" sz="2400" dirty="0"/>
+              <a:rPr lang="en-GB" sz="2400" noProof="0" dirty="0"/>
               <a:t>, which can infect many animal species such as reptiles, birds, and various mammals. </a:t>
             </a:r>
           </a:p>
           <a:p>
-            <a:endParaRPr lang="en-US" sz="2400" dirty="0"/>
-          </a:p>
-          <a:p>
-            <a:r>
-              <a:rPr lang="en-US" sz="2400" dirty="0"/>
+            <a:endParaRPr lang="en-GB" sz="2400" noProof="0" dirty="0"/>
+          </a:p>
+          <a:p>
+            <a:r>
+              <a:rPr lang="en-GB" sz="2400" noProof="0" dirty="0"/>
               <a:t>4 species naturally infect humans:</a:t>
             </a:r>
           </a:p>
           <a:p>
             <a:pPr lvl="1"/>
             <a:r>
-              <a:rPr lang="en-US" sz="2000" b="1" i="1" dirty="0"/>
+              <a:rPr lang="en-GB" sz="2000" b="1" i="1" noProof="0" dirty="0"/>
               <a:t>P. falciparum</a:t>
             </a:r>
           </a:p>
           <a:p>
             <a:pPr lvl="1"/>
             <a:r>
-              <a:rPr lang="en-US" sz="2000" b="1" i="1" dirty="0"/>
+              <a:rPr lang="en-GB" sz="2000" b="1" i="1" noProof="0" dirty="0"/>
               <a:t>P. vivax</a:t>
             </a:r>
           </a:p>
           <a:p>
             <a:pPr lvl="1"/>
             <a:r>
-              <a:rPr lang="en-US" sz="2000" i="1" dirty="0"/>
+              <a:rPr lang="en-GB" sz="2000" i="1" noProof="0" dirty="0"/>
               <a:t>P. </a:t>
             </a:r>
             <a:r>
-              <a:rPr lang="en-US" sz="2000" i="1" dirty="0" err="1"/>
+              <a:rPr lang="en-GB" sz="2000" i="1" noProof="0" dirty="0" err="1"/>
               <a:t>ovale</a:t>
             </a:r>
-            <a:endParaRPr lang="en-US" sz="2000" dirty="0"/>
+            <a:endParaRPr lang="en-GB" sz="2000" noProof="0" dirty="0"/>
           </a:p>
           <a:p>
             <a:pPr lvl="1"/>
             <a:r>
-              <a:rPr lang="en-US" sz="2000" i="1" dirty="0"/>
+              <a:rPr lang="en-GB" sz="2000" i="1" noProof="0" dirty="0"/>
               <a:t>P. </a:t>
             </a:r>
             <a:r>
-              <a:rPr lang="en-US" sz="2000" i="1" dirty="0" err="1"/>
+              <a:rPr lang="en-GB" sz="2000" i="1" noProof="0" dirty="0" err="1"/>
               <a:t>malariae</a:t>
             </a:r>
-            <a:endParaRPr lang="en-US" sz="2000" dirty="0"/>
-          </a:p>
-          <a:p>
-            <a:endParaRPr lang="en-US" sz="2400" dirty="0"/>
-          </a:p>
-          <a:p>
-            <a:r>
-              <a:rPr lang="en-US" sz="2400" dirty="0"/>
+            <a:endParaRPr lang="en-GB" sz="2000" noProof="0" dirty="0"/>
+          </a:p>
+          <a:p>
+            <a:endParaRPr lang="en-GB" sz="2400" noProof="0" dirty="0"/>
+          </a:p>
+          <a:p>
+            <a:r>
+              <a:rPr lang="en-GB" sz="2400" noProof="0" dirty="0"/>
               <a:t>1 species naturally infects macaques, but can cause zoonotic malaria in humans: </a:t>
             </a:r>
           </a:p>
           <a:p>
             <a:pPr lvl="1"/>
             <a:r>
-              <a:rPr lang="en-US" sz="2000" i="1" dirty="0"/>
+              <a:rPr lang="en-GB" sz="2000" i="1" noProof="0" dirty="0"/>
               <a:t>P. </a:t>
             </a:r>
             <a:r>
-              <a:rPr lang="en-US" sz="2000" i="1" dirty="0" err="1"/>
+              <a:rPr lang="en-GB" sz="2000" i="1" noProof="0" dirty="0" err="1"/>
               <a:t>knowlesi</a:t>
             </a:r>
             <a:r>
-              <a:rPr lang="en-US" sz="2000" dirty="0"/>
+              <a:rPr lang="en-GB" sz="2000" noProof="0" dirty="0"/>
               <a:t> </a:t>
             </a:r>
-            <a:endParaRPr lang="en-GB" sz="2000" dirty="0"/>
           </a:p>
         </p:txBody>
       </p:sp>
@@ -23091,7 +23533,7 @@
               </a:spcBef>
             </a:pPr>
             <a:r>
-              <a:rPr lang="en-US" sz="2400" dirty="0"/>
+              <a:rPr lang="en-GB" sz="2400" noProof="0" dirty="0"/>
               <a:t>Non-photosynthetic plastid found in most Apicomplexa</a:t>
             </a:r>
           </a:p>
@@ -23101,7 +23543,7 @@
                 <a:spcPts val="600"/>
               </a:spcBef>
             </a:pPr>
-            <a:endParaRPr lang="en-US" sz="2400" dirty="0"/>
+            <a:endParaRPr lang="en-GB" sz="2400" noProof="0" dirty="0"/>
           </a:p>
           <a:p>
             <a:pPr>
@@ -23110,15 +23552,15 @@
               </a:spcBef>
             </a:pPr>
             <a:r>
-              <a:rPr lang="en-US" sz="2400" dirty="0"/>
+              <a:rPr lang="en-GB" sz="2400" noProof="0" dirty="0"/>
               <a:t>Contains</a:t>
             </a:r>
             <a:r>
-              <a:rPr lang="en-US" sz="2400" b="1" dirty="0"/>
+              <a:rPr lang="en-GB" sz="2400" b="1" noProof="0" dirty="0"/>
               <a:t> 35 kb long circular DNA strand </a:t>
             </a:r>
             <a:r>
-              <a:rPr lang="en-US" sz="2400" dirty="0"/>
+              <a:rPr lang="en-GB" sz="2400" noProof="0" dirty="0"/>
               <a:t>that codes for approximately 30 proteins, tRNAs and some RNAs.</a:t>
             </a:r>
           </a:p>
@@ -23129,10 +23571,9 @@
               </a:spcBef>
             </a:pPr>
             <a:r>
-              <a:rPr lang="en-US" sz="2400" dirty="0"/>
+              <a:rPr lang="en-GB" sz="2400" noProof="0" dirty="0"/>
               <a:t>DNA is of red algal and bacterial origin</a:t>
             </a:r>
-            <a:endParaRPr lang="en-GB" sz="2400" dirty="0"/>
           </a:p>
           <a:p>
             <a:pPr>
@@ -23140,7 +23581,7 @@
                 <a:spcPts val="600"/>
               </a:spcBef>
             </a:pPr>
-            <a:endParaRPr lang="en-US" sz="2400" dirty="0"/>
+            <a:endParaRPr lang="en-GB" sz="2400" noProof="0" dirty="0"/>
           </a:p>
           <a:p>
             <a:pPr>
@@ -23149,7 +23590,7 @@
               </a:spcBef>
             </a:pPr>
             <a:r>
-              <a:rPr lang="en-US" sz="2400" dirty="0"/>
+              <a:rPr lang="en-GB" sz="2400" noProof="0" dirty="0"/>
               <a:t>Encoded metabolic pathways are similar to those found in bacteria and distinct from the pathways found in the mammalian host. </a:t>
             </a:r>
           </a:p>
@@ -23160,10 +23601,9 @@
               </a:spcBef>
             </a:pPr>
             <a:r>
-              <a:rPr lang="en-US" sz="2100" dirty="0"/>
+              <a:rPr lang="en-GB" sz="2100" noProof="0" dirty="0"/>
               <a:t>Potential drug targets</a:t>
             </a:r>
-            <a:endParaRPr lang="en-GB" sz="2100" dirty="0"/>
           </a:p>
         </p:txBody>
       </p:sp>
@@ -23401,11 +23841,11 @@
           </a:bodyPr>
           <a:lstStyle/>
           <a:p>
-            <a:endParaRPr lang="en-US" sz="2400" dirty="0"/>
-          </a:p>
-          <a:p>
-            <a:r>
-              <a:rPr lang="en-US" sz="2400" dirty="0"/>
+            <a:endParaRPr lang="en-GB" sz="2400" noProof="0" dirty="0"/>
+          </a:p>
+          <a:p>
+            <a:r>
+              <a:rPr lang="en-GB" sz="2400" noProof="0" dirty="0"/>
               <a:t>Tandemly repeated, linear element of 6 kb. </a:t>
             </a:r>
           </a:p>
@@ -23415,7 +23855,7 @@
                 <a:spcPts val="0"/>
               </a:spcBef>
             </a:pPr>
-            <a:endParaRPr lang="en-US" sz="2400" dirty="0"/>
+            <a:endParaRPr lang="en-GB" sz="2400" noProof="0" dirty="0"/>
           </a:p>
           <a:p>
             <a:pPr>
@@ -23424,7 +23864,7 @@
               </a:spcBef>
             </a:pPr>
             <a:r>
-              <a:rPr lang="en-US" sz="2400" dirty="0"/>
+              <a:rPr lang="en-GB" sz="2400" noProof="0" dirty="0"/>
               <a:t>Encodes</a:t>
             </a:r>
           </a:p>
@@ -23435,7 +23875,7 @@
               </a:spcBef>
             </a:pPr>
             <a:r>
-              <a:rPr lang="en-US" sz="2100" dirty="0"/>
+              <a:rPr lang="en-GB" sz="2100" noProof="0" dirty="0"/>
               <a:t>Three protein genes</a:t>
             </a:r>
           </a:p>
@@ -23446,23 +23886,23 @@
               </a:spcBef>
             </a:pPr>
             <a:r>
-              <a:rPr lang="en-US" sz="1900" i="1" dirty="0"/>
+              <a:rPr lang="en-GB" sz="1900" i="1" noProof="0" dirty="0"/>
               <a:t>cox1</a:t>
             </a:r>
             <a:r>
-              <a:rPr lang="en-US" sz="1900" dirty="0"/>
+              <a:rPr lang="en-GB" sz="1900" noProof="0" dirty="0"/>
               <a:t>, </a:t>
             </a:r>
             <a:r>
-              <a:rPr lang="en-US" sz="1900" i="1" dirty="0"/>
+              <a:rPr lang="en-GB" sz="1900" i="1" noProof="0" dirty="0"/>
               <a:t>cox3</a:t>
             </a:r>
             <a:r>
-              <a:rPr lang="en-US" sz="1900" dirty="0"/>
+              <a:rPr lang="en-GB" sz="1900" noProof="0" dirty="0"/>
               <a:t> and </a:t>
             </a:r>
             <a:r>
-              <a:rPr lang="en-US" sz="1900" i="1" dirty="0"/>
+              <a:rPr lang="en-GB" sz="1900" i="1" noProof="0" dirty="0"/>
               <a:t>cob</a:t>
             </a:r>
           </a:p>
@@ -23473,7 +23913,7 @@
               </a:spcBef>
             </a:pPr>
             <a:r>
-              <a:rPr lang="en-US" sz="2100" dirty="0"/>
+              <a:rPr lang="en-GB" sz="2100" noProof="0" dirty="0"/>
               <a:t>large- and small-subunit ribosomal RNA (rRNA) genes</a:t>
             </a:r>
           </a:p>
@@ -23484,11 +23924,11 @@
               </a:spcBef>
             </a:pPr>
             <a:r>
-              <a:rPr lang="en-US" sz="1900" dirty="0"/>
+              <a:rPr lang="en-GB" sz="1900" noProof="0" dirty="0"/>
               <a:t>highly fragmented with 19 identified rRNA pieces</a:t>
             </a:r>
             <a:r>
-              <a:rPr lang="en-US" sz="2300" dirty="0"/>
+              <a:rPr lang="en-GB" sz="2300" noProof="0" dirty="0"/>
               <a:t>. </a:t>
             </a:r>
           </a:p>
@@ -23498,7 +23938,7 @@
                 <a:spcPts val="0"/>
               </a:spcBef>
             </a:pPr>
-            <a:endParaRPr lang="en-US" sz="2400" dirty="0"/>
+            <a:endParaRPr lang="en-GB" sz="2400" noProof="0" dirty="0"/>
           </a:p>
           <a:p>
             <a:pPr marL="0" indent="0">
@@ -23507,7 +23947,7 @@
               </a:spcBef>
               <a:buNone/>
             </a:pPr>
-            <a:endParaRPr lang="en-GB" sz="2800" dirty="0"/>
+            <a:endParaRPr lang="en-GB" sz="2800" noProof="0" dirty="0"/>
           </a:p>
         </p:txBody>
       </p:sp>
@@ -23750,15 +24190,15 @@
               <a:buChar char="•"/>
             </a:pPr>
             <a:r>
-              <a:rPr lang="en-GB" dirty="0"/>
+              <a:rPr lang="en-GB" noProof="0" dirty="0"/>
               <a:t>Nuclear genomes of </a:t>
             </a:r>
             <a:r>
-              <a:rPr lang="en-GB" i="1" dirty="0"/>
+              <a:rPr lang="en-GB" i="1" noProof="0" dirty="0"/>
               <a:t>Plasmodium</a:t>
             </a:r>
             <a:r>
-              <a:rPr lang="en-GB" dirty="0"/>
+              <a:rPr lang="en-GB" noProof="0" dirty="0"/>
               <a:t> genus members (incl. non-human) </a:t>
             </a:r>
           </a:p>
@@ -23768,7 +24208,7 @@
               <a:buChar char="•"/>
             </a:pPr>
             <a:r>
-              <a:rPr lang="en-GB" dirty="0"/>
+              <a:rPr lang="en-GB" noProof="0" dirty="0"/>
               <a:t>17 Mb to 40 Mb</a:t>
             </a:r>
           </a:p>
@@ -23778,7 +24218,7 @@
               <a:buChar char="•"/>
             </a:pPr>
             <a:r>
-              <a:rPr lang="en-GB" dirty="0"/>
+              <a:rPr lang="en-GB" noProof="0" dirty="0"/>
               <a:t>On average ~ 5500 genes </a:t>
             </a:r>
           </a:p>
@@ -23788,7 +24228,7 @@
               <a:buChar char="•"/>
             </a:pPr>
             <a:r>
-              <a:rPr lang="en-GB" dirty="0"/>
+              <a:rPr lang="en-GB" noProof="0" dirty="0"/>
               <a:t>14 chromosomes.  </a:t>
             </a:r>
           </a:p>
@@ -23797,7 +24237,7 @@
               <a:buFont typeface="Arial" panose="020B0604020202020204" pitchFamily="34" charset="0"/>
               <a:buChar char="•"/>
             </a:pPr>
-            <a:endParaRPr lang="en-GB" i="1" dirty="0"/>
+            <a:endParaRPr lang="en-GB" i="1" noProof="0" dirty="0"/>
           </a:p>
           <a:p>
             <a:pPr marL="342900" indent="-342900">
@@ -23805,11 +24245,11 @@
               <a:buChar char="•"/>
             </a:pPr>
             <a:r>
-              <a:rPr lang="en-GB" i="1" dirty="0"/>
+              <a:rPr lang="en-GB" i="1" noProof="0" dirty="0"/>
               <a:t>P. falciparum </a:t>
             </a:r>
             <a:r>
-              <a:rPr lang="en-GB" dirty="0"/>
+              <a:rPr lang="en-GB" noProof="0" dirty="0"/>
               <a:t>genome is very AT rich, complicating molecular analysis.</a:t>
             </a:r>
           </a:p>
@@ -23819,7 +24259,7 @@
               <a:buChar char="•"/>
             </a:pPr>
             <a:r>
-              <a:rPr lang="en-GB" dirty="0"/>
+              <a:rPr lang="en-GB" noProof="0" dirty="0"/>
               <a:t>~77% orthologous genes between human infecting species </a:t>
             </a:r>
           </a:p>
@@ -23829,7 +24269,7 @@
               <a:buChar char="•"/>
             </a:pPr>
             <a:r>
-              <a:rPr lang="en-GB" dirty="0"/>
+              <a:rPr lang="en-GB" noProof="0" dirty="0"/>
               <a:t>A or T homopolymers are difficult to sequence</a:t>
             </a:r>
           </a:p>
@@ -24924,46 +25364,46 @@
           <a:lstStyle/>
           <a:p>
             <a:r>
-              <a:rPr lang="en-GB" sz="2400" dirty="0"/>
+              <a:rPr lang="en-GB" sz="2400" noProof="0" dirty="0"/>
               <a:t>Mostly haploid</a:t>
             </a:r>
           </a:p>
           <a:p>
             <a:pPr lvl="1"/>
             <a:r>
-              <a:rPr lang="en-GB" sz="2400" dirty="0"/>
+              <a:rPr lang="en-GB" sz="2400" noProof="0" dirty="0"/>
               <a:t>has a single set of chromosomes</a:t>
             </a:r>
           </a:p>
           <a:p>
-            <a:endParaRPr lang="en-GB" sz="2400" dirty="0"/>
-          </a:p>
-          <a:p>
-            <a:r>
-              <a:rPr lang="en-GB" sz="2400" dirty="0"/>
+            <a:endParaRPr lang="en-GB" sz="2400" noProof="0" dirty="0"/>
+          </a:p>
+          <a:p>
+            <a:r>
+              <a:rPr lang="en-GB" sz="2400" noProof="0" dirty="0"/>
               <a:t>Diploid in the zygote,</a:t>
             </a:r>
           </a:p>
           <a:p>
             <a:pPr lvl="1"/>
             <a:r>
-              <a:rPr lang="en-GB" sz="2400" dirty="0"/>
+              <a:rPr lang="en-GB" sz="2400" noProof="0" dirty="0"/>
               <a:t>sexual recombination </a:t>
             </a:r>
           </a:p>
           <a:p>
-            <a:endParaRPr lang="en-GB" sz="2400" dirty="0"/>
-          </a:p>
-          <a:p>
-            <a:r>
-              <a:rPr lang="en-GB" sz="2400" dirty="0"/>
+            <a:endParaRPr lang="en-GB" sz="2400" noProof="0" dirty="0"/>
+          </a:p>
+          <a:p>
+            <a:r>
+              <a:rPr lang="en-GB" sz="2400" noProof="0" dirty="0"/>
               <a:t>Parasite cell to host cell ratio changes constantly</a:t>
             </a:r>
           </a:p>
           <a:p>
             <a:pPr lvl="1"/>
             <a:r>
-              <a:rPr lang="en-GB" sz="2400" dirty="0"/>
+              <a:rPr lang="en-GB" sz="2400" noProof="0" dirty="0"/>
               <a:t>i.e. Genome copy numbers change</a:t>
             </a:r>
           </a:p>
@@ -26144,21 +26584,6 @@
 </file>
 
 <file path=customXml/item1.xml><?xml version="1.0" encoding="utf-8"?>
-<?mso-contentType ?>
-<FormTemplates xmlns="http://schemas.microsoft.com/sharepoint/v3/contenttype/forms">
-  <Display>DocumentLibraryForm</Display>
-  <Edit>DocumentLibraryForm</Edit>
-  <New>DocumentLibraryForm</New>
-</FormTemplates>
-</file>
-
-<file path=customXml/item2.xml><?xml version="1.0" encoding="utf-8"?>
-<p:properties xmlns:p="http://schemas.microsoft.com/office/2006/metadata/properties" xmlns:xsi="http://www.w3.org/2001/XMLSchema-instance" xmlns:pc="http://schemas.microsoft.com/office/infopath/2007/PartnerControls">
-  <documentManagement/>
-</p:properties>
-</file>
-
-<file path=customXml/item3.xml><?xml version="1.0" encoding="utf-8"?>
 <ct:contentTypeSchema xmlns:ct="http://schemas.microsoft.com/office/2006/metadata/contentType" xmlns:ma="http://schemas.microsoft.com/office/2006/metadata/properties/metaAttributes" ct:_="" ma:_="" ma:contentTypeName="Document" ma:contentTypeID="0x010100E248A64365211844BF30BC3ADD420261" ma:contentTypeVersion="11" ma:contentTypeDescription="Create a new document." ma:contentTypeScope="" ma:versionID="bf0b94b058452ed3cec91f89e664909d">
   <xsd:schema xmlns:xsd="http://www.w3.org/2001/XMLSchema" xmlns:xs="http://www.w3.org/2001/XMLSchema" xmlns:p="http://schemas.microsoft.com/office/2006/metadata/properties" xmlns:ns2="8dbe2aa3-3237-4830-85c4-3d48417ef302" xmlns:ns3="b317b901-4ab4-4161-80c3-da5df50c25bf" targetNamespace="http://schemas.microsoft.com/office/2006/metadata/properties" ma:root="true" ma:fieldsID="d988d784501c0b668dd73c0ebdbd98a4" ns2:_="" ns3:_="">
     <xsd:import namespace="8dbe2aa3-3237-4830-85c4-3d48417ef302"/>
@@ -26369,10 +26794,36 @@
 </ct:contentTypeSchema>
 </file>
 
+<file path=customXml/item2.xml><?xml version="1.0" encoding="utf-8"?>
+<p:properties xmlns:p="http://schemas.microsoft.com/office/2006/metadata/properties" xmlns:xsi="http://www.w3.org/2001/XMLSchema-instance" xmlns:pc="http://schemas.microsoft.com/office/infopath/2007/PartnerControls">
+  <documentManagement/>
+</p:properties>
+</file>
+
+<file path=customXml/item3.xml><?xml version="1.0" encoding="utf-8"?>
+<?mso-contentType ?>
+<FormTemplates xmlns="http://schemas.microsoft.com/sharepoint/v3/contenttype/forms">
+  <Display>DocumentLibraryForm</Display>
+  <Edit>DocumentLibraryForm</Edit>
+  <New>DocumentLibraryForm</New>
+</FormTemplates>
+</file>
+
 <file path=customXml/itemProps1.xml><?xml version="1.0" encoding="utf-8"?>
-<ds:datastoreItem xmlns:ds="http://schemas.openxmlformats.org/officeDocument/2006/customXml" ds:itemID="{B1063616-57F3-4C87-BB7F-2974CF36DE76}">
+<ds:datastoreItem xmlns:ds="http://schemas.openxmlformats.org/officeDocument/2006/customXml" ds:itemID="{72E4F038-6994-4608-A1EA-AF583DA06B5C}">
   <ds:schemaRefs>
-    <ds:schemaRef ds:uri="http://schemas.microsoft.com/sharepoint/v3/contenttype/forms"/>
+    <ds:schemaRef ds:uri="http://schemas.microsoft.com/office/2006/metadata/contentType"/>
+    <ds:schemaRef ds:uri="http://schemas.microsoft.com/office/2006/metadata/properties/metaAttributes"/>
+    <ds:schemaRef ds:uri="http://www.w3.org/2001/XMLSchema"/>
+    <ds:schemaRef ds:uri="http://schemas.microsoft.com/office/2006/metadata/properties"/>
+    <ds:schemaRef ds:uri="8dbe2aa3-3237-4830-85c4-3d48417ef302"/>
+    <ds:schemaRef ds:uri="b317b901-4ab4-4161-80c3-da5df50c25bf"/>
+    <ds:schemaRef ds:uri="http://schemas.microsoft.com/office/2006/documentManagement/types"/>
+    <ds:schemaRef ds:uri="http://schemas.microsoft.com/office/infopath/2007/PartnerControls"/>
+    <ds:schemaRef ds:uri="http://schemas.openxmlformats.org/package/2006/metadata/core-properties"/>
+    <ds:schemaRef ds:uri="http://purl.org/dc/elements/1.1/"/>
+    <ds:schemaRef ds:uri="http://purl.org/dc/terms/"/>
+    <ds:schemaRef ds:uri="http://schemas.microsoft.com/internal/obd"/>
   </ds:schemaRefs>
 </ds:datastoreItem>
 </file>
@@ -26395,20 +26846,9 @@
 </file>
 
 <file path=customXml/itemProps3.xml><?xml version="1.0" encoding="utf-8"?>
-<ds:datastoreItem xmlns:ds="http://schemas.openxmlformats.org/officeDocument/2006/customXml" ds:itemID="{72E4F038-6994-4608-A1EA-AF583DA06B5C}">
+<ds:datastoreItem xmlns:ds="http://schemas.openxmlformats.org/officeDocument/2006/customXml" ds:itemID="{B1063616-57F3-4C87-BB7F-2974CF36DE76}">
   <ds:schemaRefs>
-    <ds:schemaRef ds:uri="http://schemas.microsoft.com/office/2006/metadata/contentType"/>
-    <ds:schemaRef ds:uri="http://schemas.microsoft.com/office/2006/metadata/properties/metaAttributes"/>
-    <ds:schemaRef ds:uri="http://www.w3.org/2001/XMLSchema"/>
-    <ds:schemaRef ds:uri="http://schemas.microsoft.com/office/2006/metadata/properties"/>
-    <ds:schemaRef ds:uri="8dbe2aa3-3237-4830-85c4-3d48417ef302"/>
-    <ds:schemaRef ds:uri="b317b901-4ab4-4161-80c3-da5df50c25bf"/>
-    <ds:schemaRef ds:uri="http://schemas.microsoft.com/office/2006/documentManagement/types"/>
-    <ds:schemaRef ds:uri="http://schemas.microsoft.com/office/infopath/2007/PartnerControls"/>
-    <ds:schemaRef ds:uri="http://schemas.openxmlformats.org/package/2006/metadata/core-properties"/>
-    <ds:schemaRef ds:uri="http://purl.org/dc/elements/1.1/"/>
-    <ds:schemaRef ds:uri="http://purl.org/dc/terms/"/>
-    <ds:schemaRef ds:uri="http://schemas.microsoft.com/internal/obd"/>
+    <ds:schemaRef ds:uri="http://schemas.microsoft.com/sharepoint/v3/contenttype/forms"/>
   </ds:schemaRefs>
 </ds:datastoreItem>
 </file>
</xml_diff>